<commit_message>
Update corrupted PPTX to working one
</commit_message>
<xml_diff>
--- a/images/elements/OW-Abstract Diagram.pptx
+++ b/images/elements/OW-Abstract Diagram.pptx
@@ -197,7 +197,7 @@
           <a:p>
             <a:fld id="{B7E7AA13-03CD-450D-9E48-9B034CD4C43D}" type="datetimeFigureOut">
               <a:rPr lang="en-US" smtClean="0"/>
-              <a:t>6/28/18</a:t>
+              <a:t>7/13/18</a:t>
             </a:fld>
             <a:endParaRPr lang="en-US"/>
           </a:p>
@@ -1160,7 +1160,7 @@
           <p:cNvPr id="3" name="Picture 2">
             <a:extLst>
               <a:ext uri="{FF2B5EF4-FFF2-40B4-BE49-F238E27FC236}">
-                <a16:creationId xmlns:a16="http://schemas.microsoft.com/office/drawing/2014/main" xmlns="" id="{4FD8317D-E5DC-48AE-B946-799BE935985E}"/>
+                <a16:creationId xmlns="" xmlns:a16="http://schemas.microsoft.com/office/drawing/2014/main" id="{4FD8317D-E5DC-48AE-B946-799BE935985E}"/>
               </a:ext>
             </a:extLst>
           </p:cNvPr>
@@ -1196,7 +1196,7 @@
           <p:cNvPr id="5" name="Rectangle 4">
             <a:extLst>
               <a:ext uri="{FF2B5EF4-FFF2-40B4-BE49-F238E27FC236}">
-                <a16:creationId xmlns:a16="http://schemas.microsoft.com/office/drawing/2014/main" xmlns="" id="{C250DED9-2375-4F1F-B1BB-FFBC67D08FEA}"/>
+                <a16:creationId xmlns="" xmlns:a16="http://schemas.microsoft.com/office/drawing/2014/main" id="{C250DED9-2375-4F1F-B1BB-FFBC67D08FEA}"/>
               </a:ext>
             </a:extLst>
           </p:cNvPr>
@@ -1820,6 +1820,2082 @@
           <a:chExt cx="0" cy="0"/>
         </a:xfrm>
       </p:grpSpPr>
+      <p:cxnSp>
+        <p:nvCxnSpPr>
+          <p:cNvPr id="615" name="Elbow Connector 614"/>
+          <p:cNvCxnSpPr>
+            <a:stCxn id="216" idx="3"/>
+            <a:endCxn id="612" idx="1"/>
+          </p:cNvCxnSpPr>
+          <p:nvPr/>
+        </p:nvCxnSpPr>
+        <p:spPr>
+          <a:xfrm flipV="1">
+            <a:off x="5616361" y="2793707"/>
+            <a:ext cx="2148047" cy="545174"/>
+          </a:xfrm>
+          <a:prstGeom prst="bentConnector3">
+            <a:avLst>
+              <a:gd name="adj1" fmla="val 50000"/>
+            </a:avLst>
+          </a:prstGeom>
+          <a:ln w="9525">
+            <a:solidFill>
+              <a:schemeClr val="accent4">
+                <a:lumMod val="75000"/>
+              </a:schemeClr>
+            </a:solidFill>
+            <a:prstDash val="dash"/>
+            <a:headEnd type="arrow"/>
+            <a:tailEnd type="arrow"/>
+          </a:ln>
+        </p:spPr>
+        <p:style>
+          <a:lnRef idx="1">
+            <a:schemeClr val="accent1"/>
+          </a:lnRef>
+          <a:fillRef idx="0">
+            <a:schemeClr val="accent1"/>
+          </a:fillRef>
+          <a:effectRef idx="0">
+            <a:schemeClr val="accent1"/>
+          </a:effectRef>
+          <a:fontRef idx="minor">
+            <a:schemeClr val="tx1"/>
+          </a:fontRef>
+        </p:style>
+      </p:cxnSp>
+      <p:sp>
+        <p:nvSpPr>
+          <p:cNvPr id="216" name="Rounded Rectangle 215"/>
+          <p:cNvSpPr/>
+          <p:nvPr/>
+        </p:nvSpPr>
+        <p:spPr>
+          <a:xfrm>
+            <a:off x="4044381" y="2655675"/>
+            <a:ext cx="1571980" cy="1366412"/>
+          </a:xfrm>
+          <a:prstGeom prst="roundRect">
+            <a:avLst>
+              <a:gd name="adj" fmla="val 7153"/>
+            </a:avLst>
+          </a:prstGeom>
+          <a:solidFill>
+            <a:schemeClr val="accent6">
+              <a:lumMod val="20000"/>
+              <a:lumOff val="80000"/>
+              <a:alpha val="51000"/>
+            </a:schemeClr>
+          </a:solidFill>
+          <a:ln w="34925">
+            <a:solidFill>
+              <a:schemeClr val="accent3">
+                <a:lumMod val="75000"/>
+              </a:schemeClr>
+            </a:solidFill>
+          </a:ln>
+          <a:effectLst/>
+        </p:spPr>
+        <p:style>
+          <a:lnRef idx="1">
+            <a:schemeClr val="accent1"/>
+          </a:lnRef>
+          <a:fillRef idx="3">
+            <a:schemeClr val="accent1"/>
+          </a:fillRef>
+          <a:effectRef idx="2">
+            <a:schemeClr val="accent1"/>
+          </a:effectRef>
+          <a:fontRef idx="minor">
+            <a:schemeClr val="lt1"/>
+          </a:fontRef>
+        </p:style>
+        <p:txBody>
+          <a:bodyPr rtlCol="0" anchor="t" anchorCtr="0"/>
+          <a:lstStyle/>
+          <a:p>
+            <a:pPr algn="ctr"/>
+            <a:endParaRPr lang="en-US" sz="2400" b="1" i="1" dirty="0">
+              <a:solidFill>
+                <a:schemeClr val="accent1">
+                  <a:lumMod val="50000"/>
+                </a:schemeClr>
+              </a:solidFill>
+            </a:endParaRPr>
+          </a:p>
+        </p:txBody>
+      </p:sp>
+      <p:cxnSp>
+        <p:nvCxnSpPr>
+          <p:cNvPr id="281" name="Elbow Connector 280"/>
+          <p:cNvCxnSpPr>
+            <a:stCxn id="187" idx="3"/>
+            <a:endCxn id="216" idx="1"/>
+          </p:cNvCxnSpPr>
+          <p:nvPr/>
+        </p:nvCxnSpPr>
+        <p:spPr>
+          <a:xfrm>
+            <a:off x="3634305" y="2321426"/>
+            <a:ext cx="410076" cy="1017455"/>
+          </a:xfrm>
+          <a:prstGeom prst="bentConnector3">
+            <a:avLst>
+              <a:gd name="adj1" fmla="val 50000"/>
+            </a:avLst>
+          </a:prstGeom>
+          <a:ln w="9525">
+            <a:solidFill>
+              <a:schemeClr val="accent5">
+                <a:lumMod val="50000"/>
+              </a:schemeClr>
+            </a:solidFill>
+            <a:prstDash val="sysDot"/>
+            <a:headEnd type="none"/>
+            <a:tailEnd type="arrow"/>
+          </a:ln>
+        </p:spPr>
+        <p:style>
+          <a:lnRef idx="1">
+            <a:schemeClr val="accent1"/>
+          </a:lnRef>
+          <a:fillRef idx="0">
+            <a:schemeClr val="accent1"/>
+          </a:fillRef>
+          <a:effectRef idx="0">
+            <a:schemeClr val="accent1"/>
+          </a:effectRef>
+          <a:fontRef idx="minor">
+            <a:schemeClr val="tx1"/>
+          </a:fontRef>
+        </p:style>
+      </p:cxnSp>
+      <p:cxnSp>
+        <p:nvCxnSpPr>
+          <p:cNvPr id="282" name="Elbow Connector 281"/>
+          <p:cNvCxnSpPr>
+            <a:stCxn id="185" idx="3"/>
+            <a:endCxn id="216" idx="1"/>
+          </p:cNvCxnSpPr>
+          <p:nvPr/>
+        </p:nvCxnSpPr>
+        <p:spPr>
+          <a:xfrm>
+            <a:off x="3338734" y="2928451"/>
+            <a:ext cx="705647" cy="410430"/>
+          </a:xfrm>
+          <a:prstGeom prst="bentConnector3">
+            <a:avLst>
+              <a:gd name="adj1" fmla="val 50000"/>
+            </a:avLst>
+          </a:prstGeom>
+          <a:ln w="9525">
+            <a:solidFill>
+              <a:schemeClr val="accent5">
+                <a:lumMod val="50000"/>
+              </a:schemeClr>
+            </a:solidFill>
+            <a:prstDash val="sysDot"/>
+            <a:headEnd type="none"/>
+            <a:tailEnd type="arrow"/>
+          </a:ln>
+        </p:spPr>
+        <p:style>
+          <a:lnRef idx="1">
+            <a:schemeClr val="accent1"/>
+          </a:lnRef>
+          <a:fillRef idx="0">
+            <a:schemeClr val="accent1"/>
+          </a:fillRef>
+          <a:effectRef idx="0">
+            <a:schemeClr val="accent1"/>
+          </a:effectRef>
+          <a:fontRef idx="minor">
+            <a:schemeClr val="tx1"/>
+          </a:fontRef>
+        </p:style>
+      </p:cxnSp>
+      <p:cxnSp>
+        <p:nvCxnSpPr>
+          <p:cNvPr id="283" name="Elbow Connector 282"/>
+          <p:cNvCxnSpPr>
+            <a:stCxn id="198" idx="3"/>
+            <a:endCxn id="216" idx="1"/>
+          </p:cNvCxnSpPr>
+          <p:nvPr/>
+        </p:nvCxnSpPr>
+        <p:spPr>
+          <a:xfrm flipV="1">
+            <a:off x="3338734" y="3338881"/>
+            <a:ext cx="705647" cy="203444"/>
+          </a:xfrm>
+          <a:prstGeom prst="bentConnector3">
+            <a:avLst>
+              <a:gd name="adj1" fmla="val 50000"/>
+            </a:avLst>
+          </a:prstGeom>
+          <a:ln w="9525">
+            <a:solidFill>
+              <a:schemeClr val="accent5">
+                <a:lumMod val="50000"/>
+              </a:schemeClr>
+            </a:solidFill>
+            <a:prstDash val="sysDot"/>
+            <a:headEnd type="none"/>
+            <a:tailEnd type="arrow"/>
+          </a:ln>
+        </p:spPr>
+        <p:style>
+          <a:lnRef idx="1">
+            <a:schemeClr val="accent1"/>
+          </a:lnRef>
+          <a:fillRef idx="0">
+            <a:schemeClr val="accent1"/>
+          </a:fillRef>
+          <a:effectRef idx="0">
+            <a:schemeClr val="accent1"/>
+          </a:effectRef>
+          <a:fontRef idx="minor">
+            <a:schemeClr val="tx1"/>
+          </a:fontRef>
+        </p:style>
+      </p:cxnSp>
+      <p:cxnSp>
+        <p:nvCxnSpPr>
+          <p:cNvPr id="284" name="Elbow Connector 283"/>
+          <p:cNvCxnSpPr>
+            <a:stCxn id="287" idx="3"/>
+            <a:endCxn id="216" idx="1"/>
+          </p:cNvCxnSpPr>
+          <p:nvPr/>
+        </p:nvCxnSpPr>
+        <p:spPr>
+          <a:xfrm flipV="1">
+            <a:off x="3634305" y="3338881"/>
+            <a:ext cx="410076" cy="818458"/>
+          </a:xfrm>
+          <a:prstGeom prst="bentConnector3">
+            <a:avLst>
+              <a:gd name="adj1" fmla="val 50000"/>
+            </a:avLst>
+          </a:prstGeom>
+          <a:ln w="9525">
+            <a:solidFill>
+              <a:schemeClr val="accent5">
+                <a:lumMod val="50000"/>
+              </a:schemeClr>
+            </a:solidFill>
+            <a:prstDash val="sysDot"/>
+            <a:headEnd type="none"/>
+            <a:tailEnd type="arrow"/>
+          </a:ln>
+        </p:spPr>
+        <p:style>
+          <a:lnRef idx="1">
+            <a:schemeClr val="accent1"/>
+          </a:lnRef>
+          <a:fillRef idx="0">
+            <a:schemeClr val="accent1"/>
+          </a:fillRef>
+          <a:effectRef idx="0">
+            <a:schemeClr val="accent1"/>
+          </a:effectRef>
+          <a:fontRef idx="minor">
+            <a:schemeClr val="tx1"/>
+          </a:fontRef>
+        </p:style>
+      </p:cxnSp>
+      <p:grpSp>
+        <p:nvGrpSpPr>
+          <p:cNvPr id="370" name="Group 369"/>
+          <p:cNvGrpSpPr/>
+          <p:nvPr/>
+        </p:nvGrpSpPr>
+        <p:grpSpPr>
+          <a:xfrm>
+            <a:off x="1981200" y="3268004"/>
+            <a:ext cx="1357534" cy="548640"/>
+            <a:chOff x="1625438" y="3581400"/>
+            <a:chExt cx="1357534" cy="548640"/>
+          </a:xfrm>
+        </p:grpSpPr>
+        <p:pic>
+          <p:nvPicPr>
+            <p:cNvPr id="193" name="image.png" descr="image.png"/>
+            <p:cNvPicPr>
+              <a:picLocks noChangeAspect="1"/>
+            </p:cNvPicPr>
+            <p:nvPr/>
+          </p:nvPicPr>
+          <p:blipFill>
+            <a:blip r:embed="rId3">
+              <a:extLst/>
+            </a:blip>
+            <a:srcRect/>
+            <a:stretch>
+              <a:fillRect/>
+            </a:stretch>
+          </p:blipFill>
+          <p:spPr>
+            <a:xfrm rot="5400000">
+              <a:off x="2211674" y="3725547"/>
+              <a:ext cx="354780" cy="260348"/>
+            </a:xfrm>
+            <a:prstGeom prst="rect">
+              <a:avLst/>
+            </a:prstGeom>
+            <a:solidFill>
+              <a:schemeClr val="bg1"/>
+            </a:solidFill>
+            <a:ln w="12700" cap="flat">
+              <a:noFill/>
+              <a:miter lim="400000"/>
+            </a:ln>
+            <a:effectLst/>
+          </p:spPr>
+        </p:pic>
+        <p:pic>
+          <p:nvPicPr>
+            <p:cNvPr id="198" name="pasted-image.pdf" descr="pasted-image.pdf"/>
+            <p:cNvPicPr>
+              <a:picLocks noChangeAspect="1"/>
+            </p:cNvPicPr>
+            <p:nvPr/>
+          </p:nvPicPr>
+          <p:blipFill>
+            <a:blip r:embed="rId4">
+              <a:alphaModFix amt="63000"/>
+              <a:extLst>
+                <a:ext uri="{BEBA8EAE-BF5A-486C-A8C5-ECC9F3942E4B}">
+                  <a14:imgProps xmlns:a14="http://schemas.microsoft.com/office/drawing/2010/main">
+                    <a14:imgLayer r:embed="rId5">
+                      <a14:imgEffect>
+                        <a14:colorTemperature colorTemp="6944"/>
+                      </a14:imgEffect>
+                      <a14:imgEffect>
+                        <a14:saturation sat="400000"/>
+                      </a14:imgEffect>
+                    </a14:imgLayer>
+                  </a14:imgProps>
+                </a:ext>
+              </a:extLst>
+            </a:blip>
+            <a:stretch>
+              <a:fillRect/>
+            </a:stretch>
+          </p:blipFill>
+          <p:spPr>
+            <a:xfrm>
+              <a:off x="2593988" y="3625506"/>
+              <a:ext cx="388984" cy="460429"/>
+            </a:xfrm>
+            <a:prstGeom prst="rect">
+              <a:avLst/>
+            </a:prstGeom>
+            <a:solidFill>
+              <a:schemeClr val="bg1"/>
+            </a:solidFill>
+            <a:ln w="12700" cap="flat">
+              <a:noFill/>
+              <a:miter lim="400000"/>
+            </a:ln>
+            <a:effectLst/>
+          </p:spPr>
+        </p:pic>
+        <p:pic>
+          <p:nvPicPr>
+            <p:cNvPr id="132" name="Picture 131"/>
+            <p:cNvPicPr>
+              <a:picLocks noChangeAspect="1"/>
+            </p:cNvPicPr>
+            <p:nvPr/>
+          </p:nvPicPr>
+          <p:blipFill>
+            <a:blip r:embed="rId6">
+              <a:extLst>
+                <a:ext uri="{28A0092B-C50C-407E-A947-70E740481C1C}">
+                  <a14:useLocalDpi xmlns:a14="http://schemas.microsoft.com/office/drawing/2010/main" val="0"/>
+                </a:ext>
+              </a:extLst>
+            </a:blip>
+            <a:stretch>
+              <a:fillRect/>
+            </a:stretch>
+          </p:blipFill>
+          <p:spPr>
+            <a:xfrm>
+              <a:off x="1625438" y="3581400"/>
+              <a:ext cx="573865" cy="548640"/>
+            </a:xfrm>
+            <a:prstGeom prst="rect">
+              <a:avLst/>
+            </a:prstGeom>
+          </p:spPr>
+        </p:pic>
+      </p:grpSp>
+      <p:pic>
+        <p:nvPicPr>
+          <p:cNvPr id="136" name="Picture 135"/>
+          <p:cNvPicPr>
+            <a:picLocks noChangeAspect="1"/>
+          </p:cNvPicPr>
+          <p:nvPr/>
+        </p:nvPicPr>
+        <p:blipFill>
+          <a:blip r:embed="rId7">
+            <a:extLst>
+              <a:ext uri="{28A0092B-C50C-407E-A947-70E740481C1C}">
+                <a14:useLocalDpi xmlns:a14="http://schemas.microsoft.com/office/drawing/2010/main" val="0"/>
+              </a:ext>
+            </a:extLst>
+          </a:blip>
+          <a:stretch>
+            <a:fillRect/>
+          </a:stretch>
+        </p:blipFill>
+        <p:spPr>
+          <a:xfrm>
+            <a:off x="4141643" y="2848996"/>
+            <a:ext cx="1363787" cy="967648"/>
+          </a:xfrm>
+          <a:prstGeom prst="rect">
+            <a:avLst/>
+          </a:prstGeom>
+        </p:spPr>
+      </p:pic>
+      <p:grpSp>
+        <p:nvGrpSpPr>
+          <p:cNvPr id="360" name="Group 359"/>
+          <p:cNvGrpSpPr/>
+          <p:nvPr/>
+        </p:nvGrpSpPr>
+        <p:grpSpPr>
+          <a:xfrm>
+            <a:off x="1999240" y="2666188"/>
+            <a:ext cx="1339494" cy="524524"/>
+            <a:chOff x="1639636" y="2919218"/>
+            <a:chExt cx="1339494" cy="524524"/>
+          </a:xfrm>
+        </p:grpSpPr>
+        <p:pic>
+          <p:nvPicPr>
+            <p:cNvPr id="185" name="pasted-image.pdf" descr="pasted-image.pdf"/>
+            <p:cNvPicPr>
+              <a:picLocks noChangeAspect="1"/>
+            </p:cNvPicPr>
+            <p:nvPr/>
+          </p:nvPicPr>
+          <p:blipFill>
+            <a:blip r:embed="rId4">
+              <a:alphaModFix amt="63000"/>
+              <a:extLst>
+                <a:ext uri="{BEBA8EAE-BF5A-486C-A8C5-ECC9F3942E4B}">
+                  <a14:imgProps xmlns:a14="http://schemas.microsoft.com/office/drawing/2010/main">
+                    <a14:imgLayer r:embed="rId5">
+                      <a14:imgEffect>
+                        <a14:colorTemperature colorTemp="6944"/>
+                      </a14:imgEffect>
+                      <a14:imgEffect>
+                        <a14:saturation sat="400000"/>
+                      </a14:imgEffect>
+                    </a14:imgLayer>
+                  </a14:imgProps>
+                </a:ext>
+              </a:extLst>
+            </a:blip>
+            <a:stretch>
+              <a:fillRect/>
+            </a:stretch>
+          </p:blipFill>
+          <p:spPr>
+            <a:xfrm>
+              <a:off x="2590146" y="2951266"/>
+              <a:ext cx="388984" cy="460429"/>
+            </a:xfrm>
+            <a:prstGeom prst="rect">
+              <a:avLst/>
+            </a:prstGeom>
+            <a:solidFill>
+              <a:schemeClr val="bg1"/>
+            </a:solidFill>
+            <a:ln w="12700" cap="flat">
+              <a:noFill/>
+              <a:miter lim="400000"/>
+            </a:ln>
+            <a:effectLst/>
+          </p:spPr>
+        </p:pic>
+        <p:pic>
+          <p:nvPicPr>
+            <p:cNvPr id="188" name="image.png" descr="image.png"/>
+            <p:cNvPicPr>
+              <a:picLocks noChangeAspect="1"/>
+            </p:cNvPicPr>
+            <p:nvPr/>
+          </p:nvPicPr>
+          <p:blipFill>
+            <a:blip r:embed="rId3">
+              <a:extLst/>
+            </a:blip>
+            <a:srcRect/>
+            <a:stretch>
+              <a:fillRect/>
+            </a:stretch>
+          </p:blipFill>
+          <p:spPr>
+            <a:xfrm rot="5400000">
+              <a:off x="2211674" y="3051306"/>
+              <a:ext cx="354780" cy="260348"/>
+            </a:xfrm>
+            <a:prstGeom prst="rect">
+              <a:avLst/>
+            </a:prstGeom>
+            <a:solidFill>
+              <a:schemeClr val="bg1"/>
+            </a:solidFill>
+            <a:ln w="12700" cap="flat">
+              <a:noFill/>
+              <a:miter lim="400000"/>
+            </a:ln>
+            <a:effectLst/>
+          </p:spPr>
+        </p:pic>
+        <p:pic>
+          <p:nvPicPr>
+            <p:cNvPr id="137" name="Picture 136"/>
+            <p:cNvPicPr>
+              <a:picLocks noChangeAspect="1"/>
+            </p:cNvPicPr>
+            <p:nvPr/>
+          </p:nvPicPr>
+          <p:blipFill>
+            <a:blip r:embed="rId8">
+              <a:extLst>
+                <a:ext uri="{28A0092B-C50C-407E-A947-70E740481C1C}">
+                  <a14:useLocalDpi xmlns:a14="http://schemas.microsoft.com/office/drawing/2010/main" val="0"/>
+                </a:ext>
+              </a:extLst>
+            </a:blip>
+            <a:stretch>
+              <a:fillRect/>
+            </a:stretch>
+          </p:blipFill>
+          <p:spPr>
+            <a:xfrm>
+              <a:off x="1639636" y="2919218"/>
+              <a:ext cx="548640" cy="524524"/>
+            </a:xfrm>
+            <a:prstGeom prst="rect">
+              <a:avLst/>
+            </a:prstGeom>
+          </p:spPr>
+        </p:pic>
+      </p:grpSp>
+      <p:grpSp>
+        <p:nvGrpSpPr>
+          <p:cNvPr id="371" name="Group 370"/>
+          <p:cNvGrpSpPr/>
+          <p:nvPr/>
+        </p:nvGrpSpPr>
+        <p:grpSpPr>
+          <a:xfrm>
+            <a:off x="2286000" y="3895076"/>
+            <a:ext cx="1348305" cy="524524"/>
+            <a:chOff x="1634667" y="4261486"/>
+            <a:chExt cx="1348305" cy="524524"/>
+          </a:xfrm>
+        </p:grpSpPr>
+        <p:pic>
+          <p:nvPicPr>
+            <p:cNvPr id="287" name="pasted-image.pdf" descr="pasted-image.pdf"/>
+            <p:cNvPicPr>
+              <a:picLocks noChangeAspect="1"/>
+            </p:cNvPicPr>
+            <p:nvPr/>
+          </p:nvPicPr>
+          <p:blipFill>
+            <a:blip r:embed="rId4">
+              <a:alphaModFix amt="63000"/>
+              <a:extLst>
+                <a:ext uri="{BEBA8EAE-BF5A-486C-A8C5-ECC9F3942E4B}">
+                  <a14:imgProps xmlns:a14="http://schemas.microsoft.com/office/drawing/2010/main">
+                    <a14:imgLayer r:embed="rId5">
+                      <a14:imgEffect>
+                        <a14:colorTemperature colorTemp="6944"/>
+                      </a14:imgEffect>
+                      <a14:imgEffect>
+                        <a14:saturation sat="400000"/>
+                      </a14:imgEffect>
+                    </a14:imgLayer>
+                  </a14:imgProps>
+                </a:ext>
+              </a:extLst>
+            </a:blip>
+            <a:stretch>
+              <a:fillRect/>
+            </a:stretch>
+          </p:blipFill>
+          <p:spPr>
+            <a:xfrm>
+              <a:off x="2593988" y="4293534"/>
+              <a:ext cx="388984" cy="460429"/>
+            </a:xfrm>
+            <a:prstGeom prst="rect">
+              <a:avLst/>
+            </a:prstGeom>
+            <a:solidFill>
+              <a:schemeClr val="bg1"/>
+            </a:solidFill>
+            <a:ln w="12700" cap="flat">
+              <a:noFill/>
+              <a:miter lim="400000"/>
+            </a:ln>
+            <a:effectLst/>
+          </p:spPr>
+        </p:pic>
+        <p:pic>
+          <p:nvPicPr>
+            <p:cNvPr id="162" name="image.png" descr="image.png"/>
+            <p:cNvPicPr>
+              <a:picLocks noChangeAspect="1"/>
+            </p:cNvPicPr>
+            <p:nvPr/>
+          </p:nvPicPr>
+          <p:blipFill>
+            <a:blip r:embed="rId3">
+              <a:extLst/>
+            </a:blip>
+            <a:srcRect/>
+            <a:stretch>
+              <a:fillRect/>
+            </a:stretch>
+          </p:blipFill>
+          <p:spPr>
+            <a:xfrm rot="5400000">
+              <a:off x="2206041" y="4393574"/>
+              <a:ext cx="354780" cy="260348"/>
+            </a:xfrm>
+            <a:prstGeom prst="rect">
+              <a:avLst/>
+            </a:prstGeom>
+            <a:solidFill>
+              <a:schemeClr val="bg1"/>
+            </a:solidFill>
+            <a:ln w="12700" cap="flat">
+              <a:noFill/>
+              <a:miter lim="400000"/>
+            </a:ln>
+            <a:effectLst/>
+          </p:spPr>
+        </p:pic>
+        <p:pic>
+          <p:nvPicPr>
+            <p:cNvPr id="138" name="Picture 137"/>
+            <p:cNvPicPr>
+              <a:picLocks noChangeAspect="1"/>
+            </p:cNvPicPr>
+            <p:nvPr/>
+          </p:nvPicPr>
+          <p:blipFill>
+            <a:blip r:embed="rId9">
+              <a:extLst>
+                <a:ext uri="{28A0092B-C50C-407E-A947-70E740481C1C}">
+                  <a14:useLocalDpi xmlns:a14="http://schemas.microsoft.com/office/drawing/2010/main" val="0"/>
+                </a:ext>
+              </a:extLst>
+            </a:blip>
+            <a:stretch>
+              <a:fillRect/>
+            </a:stretch>
+          </p:blipFill>
+          <p:spPr>
+            <a:xfrm>
+              <a:off x="1634667" y="4261486"/>
+              <a:ext cx="548640" cy="524524"/>
+            </a:xfrm>
+            <a:prstGeom prst="rect">
+              <a:avLst/>
+            </a:prstGeom>
+          </p:spPr>
+        </p:pic>
+      </p:grpSp>
+      <p:grpSp>
+        <p:nvGrpSpPr>
+          <p:cNvPr id="441" name="Group 440"/>
+          <p:cNvGrpSpPr/>
+          <p:nvPr/>
+        </p:nvGrpSpPr>
+        <p:grpSpPr>
+          <a:xfrm>
+            <a:off x="2295443" y="2059721"/>
+            <a:ext cx="1338862" cy="523408"/>
+            <a:chOff x="2066629" y="2351356"/>
+            <a:chExt cx="1338862" cy="523408"/>
+          </a:xfrm>
+        </p:grpSpPr>
+        <p:pic>
+          <p:nvPicPr>
+            <p:cNvPr id="187" name="pasted-image.pdf" descr="pasted-image.pdf"/>
+            <p:cNvPicPr>
+              <a:picLocks noChangeAspect="1"/>
+            </p:cNvPicPr>
+            <p:nvPr/>
+          </p:nvPicPr>
+          <p:blipFill>
+            <a:blip r:embed="rId4">
+              <a:alphaModFix amt="63000"/>
+              <a:extLst>
+                <a:ext uri="{BEBA8EAE-BF5A-486C-A8C5-ECC9F3942E4B}">
+                  <a14:imgProps xmlns:a14="http://schemas.microsoft.com/office/drawing/2010/main">
+                    <a14:imgLayer r:embed="rId5">
+                      <a14:imgEffect>
+                        <a14:colorTemperature colorTemp="6944"/>
+                      </a14:imgEffect>
+                      <a14:imgEffect>
+                        <a14:saturation sat="400000"/>
+                      </a14:imgEffect>
+                    </a14:imgLayer>
+                  </a14:imgProps>
+                </a:ext>
+              </a:extLst>
+            </a:blip>
+            <a:stretch>
+              <a:fillRect/>
+            </a:stretch>
+          </p:blipFill>
+          <p:spPr>
+            <a:xfrm>
+              <a:off x="3016507" y="2382846"/>
+              <a:ext cx="388984" cy="460429"/>
+            </a:xfrm>
+            <a:prstGeom prst="rect">
+              <a:avLst/>
+            </a:prstGeom>
+            <a:solidFill>
+              <a:schemeClr val="bg1"/>
+            </a:solidFill>
+            <a:ln w="12700" cap="flat">
+              <a:noFill/>
+              <a:miter lim="400000"/>
+            </a:ln>
+            <a:effectLst/>
+          </p:spPr>
+        </p:pic>
+        <p:pic>
+          <p:nvPicPr>
+            <p:cNvPr id="192" name="image.png" descr="image.png"/>
+            <p:cNvPicPr>
+              <a:picLocks noChangeAspect="1"/>
+            </p:cNvPicPr>
+            <p:nvPr/>
+          </p:nvPicPr>
+          <p:blipFill>
+            <a:blip r:embed="rId3">
+              <a:extLst/>
+            </a:blip>
+            <a:srcRect/>
+            <a:stretch>
+              <a:fillRect/>
+            </a:stretch>
+          </p:blipFill>
+          <p:spPr>
+            <a:xfrm rot="5400000">
+              <a:off x="2638003" y="2482886"/>
+              <a:ext cx="354780" cy="260348"/>
+            </a:xfrm>
+            <a:prstGeom prst="rect">
+              <a:avLst/>
+            </a:prstGeom>
+            <a:solidFill>
+              <a:schemeClr val="bg1"/>
+            </a:solidFill>
+            <a:ln w="12700" cap="flat">
+              <a:noFill/>
+              <a:miter lim="400000"/>
+            </a:ln>
+            <a:effectLst/>
+          </p:spPr>
+        </p:pic>
+        <p:pic>
+          <p:nvPicPr>
+            <p:cNvPr id="440" name="Picture 439"/>
+            <p:cNvPicPr>
+              <a:picLocks noChangeAspect="1"/>
+            </p:cNvPicPr>
+            <p:nvPr/>
+          </p:nvPicPr>
+          <p:blipFill>
+            <a:blip r:embed="rId10">
+              <a:extLst>
+                <a:ext uri="{28A0092B-C50C-407E-A947-70E740481C1C}">
+                  <a14:useLocalDpi xmlns:a14="http://schemas.microsoft.com/office/drawing/2010/main" val="0"/>
+                </a:ext>
+              </a:extLst>
+            </a:blip>
+            <a:stretch>
+              <a:fillRect/>
+            </a:stretch>
+          </p:blipFill>
+          <p:spPr>
+            <a:xfrm>
+              <a:off x="2066629" y="2351356"/>
+              <a:ext cx="548640" cy="523408"/>
+            </a:xfrm>
+            <a:prstGeom prst="rect">
+              <a:avLst/>
+            </a:prstGeom>
+          </p:spPr>
+        </p:pic>
+      </p:grpSp>
+      <p:cxnSp>
+        <p:nvCxnSpPr>
+          <p:cNvPr id="575" name="Elbow Connector 574"/>
+          <p:cNvCxnSpPr>
+            <a:stCxn id="216" idx="3"/>
+            <a:endCxn id="567" idx="1"/>
+          </p:cNvCxnSpPr>
+          <p:nvPr/>
+        </p:nvCxnSpPr>
+        <p:spPr>
+          <a:xfrm flipV="1">
+            <a:off x="5616361" y="3128505"/>
+            <a:ext cx="466862" cy="210376"/>
+          </a:xfrm>
+          <a:prstGeom prst="bentConnector3">
+            <a:avLst>
+              <a:gd name="adj1" fmla="val 50000"/>
+            </a:avLst>
+          </a:prstGeom>
+          <a:ln w="9525">
+            <a:solidFill>
+              <a:schemeClr val="accent4">
+                <a:lumMod val="75000"/>
+              </a:schemeClr>
+            </a:solidFill>
+            <a:prstDash val="dash"/>
+            <a:headEnd type="arrow"/>
+            <a:tailEnd type="arrow"/>
+          </a:ln>
+        </p:spPr>
+        <p:style>
+          <a:lnRef idx="1">
+            <a:schemeClr val="accent1"/>
+          </a:lnRef>
+          <a:fillRef idx="0">
+            <a:schemeClr val="accent1"/>
+          </a:fillRef>
+          <a:effectRef idx="0">
+            <a:schemeClr val="accent1"/>
+          </a:effectRef>
+          <a:fontRef idx="minor">
+            <a:schemeClr val="tx1"/>
+          </a:fontRef>
+        </p:style>
+      </p:cxnSp>
+      <p:pic>
+        <p:nvPicPr>
+          <p:cNvPr id="614" name="Picture 613"/>
+          <p:cNvPicPr>
+            <a:picLocks noChangeAspect="1"/>
+          </p:cNvPicPr>
+          <p:nvPr/>
+        </p:nvPicPr>
+        <p:blipFill>
+          <a:blip r:embed="rId11">
+            <a:extLst>
+              <a:ext uri="{28A0092B-C50C-407E-A947-70E740481C1C}">
+                <a14:useLocalDpi xmlns:a14="http://schemas.microsoft.com/office/drawing/2010/main" val="0"/>
+              </a:ext>
+            </a:extLst>
+          </a:blip>
+          <a:stretch>
+            <a:fillRect/>
+          </a:stretch>
+        </p:blipFill>
+        <p:spPr>
+          <a:xfrm>
+            <a:off x="6193981" y="4299941"/>
+            <a:ext cx="482678" cy="296448"/>
+          </a:xfrm>
+          <a:prstGeom prst="rect">
+            <a:avLst/>
+          </a:prstGeom>
+          <a:effectLst>
+            <a:outerShdw blurRad="12700" dist="12700" dir="2700000" algn="tl" rotWithShape="0">
+              <a:schemeClr val="bg1">
+                <a:alpha val="40000"/>
+              </a:schemeClr>
+            </a:outerShdw>
+          </a:effectLst>
+        </p:spPr>
+      </p:pic>
+      <p:cxnSp>
+        <p:nvCxnSpPr>
+          <p:cNvPr id="280" name="Elbow Connector 279"/>
+          <p:cNvCxnSpPr>
+            <a:stCxn id="216" idx="3"/>
+          </p:cNvCxnSpPr>
+          <p:nvPr/>
+        </p:nvCxnSpPr>
+        <p:spPr>
+          <a:xfrm>
+            <a:off x="5616361" y="3338881"/>
+            <a:ext cx="1349277" cy="890942"/>
+          </a:xfrm>
+          <a:prstGeom prst="bentConnector3">
+            <a:avLst>
+              <a:gd name="adj1" fmla="val 27781"/>
+            </a:avLst>
+          </a:prstGeom>
+          <a:ln w="9525">
+            <a:solidFill>
+              <a:schemeClr val="accent4">
+                <a:lumMod val="75000"/>
+              </a:schemeClr>
+            </a:solidFill>
+            <a:prstDash val="dash"/>
+            <a:headEnd type="arrow"/>
+            <a:tailEnd type="arrow"/>
+          </a:ln>
+        </p:spPr>
+        <p:style>
+          <a:lnRef idx="1">
+            <a:schemeClr val="accent1"/>
+          </a:lnRef>
+          <a:fillRef idx="0">
+            <a:schemeClr val="accent1"/>
+          </a:fillRef>
+          <a:effectRef idx="0">
+            <a:schemeClr val="accent1"/>
+          </a:effectRef>
+          <a:fontRef idx="minor">
+            <a:schemeClr val="tx1"/>
+          </a:fontRef>
+        </p:style>
+      </p:cxnSp>
+      <p:grpSp>
+        <p:nvGrpSpPr>
+          <p:cNvPr id="582" name="Group 581"/>
+          <p:cNvGrpSpPr/>
+          <p:nvPr/>
+        </p:nvGrpSpPr>
+        <p:grpSpPr>
+          <a:xfrm>
+            <a:off x="6083223" y="2188411"/>
+            <a:ext cx="1943934" cy="1880187"/>
+            <a:chOff x="6092546" y="2173024"/>
+            <a:chExt cx="1943934" cy="1880187"/>
+          </a:xfrm>
+        </p:grpSpPr>
+        <p:sp>
+          <p:nvSpPr>
+            <p:cNvPr id="567" name="Rectangle 566"/>
+            <p:cNvSpPr/>
+            <p:nvPr/>
+          </p:nvSpPr>
+          <p:spPr>
+            <a:xfrm>
+              <a:off x="6092546" y="2173024"/>
+              <a:ext cx="1943934" cy="1880187"/>
+            </a:xfrm>
+            <a:prstGeom prst="rect">
+              <a:avLst/>
+            </a:prstGeom>
+            <a:solidFill>
+              <a:srgbClr val="E6F4F5">
+                <a:alpha val="80000"/>
+              </a:srgbClr>
+            </a:solidFill>
+            <a:ln>
+              <a:solidFill>
+                <a:schemeClr val="bg1">
+                  <a:lumMod val="75000"/>
+                  <a:alpha val="40000"/>
+                </a:schemeClr>
+              </a:solidFill>
+              <a:prstDash val="dash"/>
+            </a:ln>
+          </p:spPr>
+          <p:style>
+            <a:lnRef idx="2">
+              <a:schemeClr val="accent1">
+                <a:shade val="50000"/>
+              </a:schemeClr>
+            </a:lnRef>
+            <a:fillRef idx="1">
+              <a:schemeClr val="accent1"/>
+            </a:fillRef>
+            <a:effectRef idx="0">
+              <a:schemeClr val="accent1"/>
+            </a:effectRef>
+            <a:fontRef idx="minor">
+              <a:schemeClr val="lt1"/>
+            </a:fontRef>
+          </p:style>
+          <p:txBody>
+            <a:bodyPr wrap="none" rtlCol="0" anchor="ctr"/>
+            <a:lstStyle/>
+            <a:p>
+              <a:pPr algn="ctr"/>
+              <a:endParaRPr lang="en-US" sz="1400" smtClean="0">
+                <a:solidFill>
+                  <a:schemeClr val="tx1">
+                    <a:lumMod val="85000"/>
+                    <a:lumOff val="15000"/>
+                  </a:schemeClr>
+                </a:solidFill>
+              </a:endParaRPr>
+            </a:p>
+          </p:txBody>
+        </p:sp>
+        <p:grpSp>
+          <p:nvGrpSpPr>
+            <p:cNvPr id="1049" name="Group 1048"/>
+            <p:cNvGrpSpPr/>
+            <p:nvPr/>
+          </p:nvGrpSpPr>
+          <p:grpSpPr>
+            <a:xfrm>
+              <a:off x="6191121" y="3168351"/>
+              <a:ext cx="962406" cy="824502"/>
+              <a:chOff x="8365690" y="2911597"/>
+              <a:chExt cx="962406" cy="824502"/>
+            </a:xfrm>
+            <a:effectLst>
+              <a:outerShdw blurRad="12700" dist="12700" dir="2700000" algn="tl" rotWithShape="0">
+                <a:prstClr val="black">
+                  <a:alpha val="40000"/>
+                </a:prstClr>
+              </a:outerShdw>
+            </a:effectLst>
+          </p:grpSpPr>
+          <p:grpSp>
+            <p:nvGrpSpPr>
+              <p:cNvPr id="420" name="Group 419"/>
+              <p:cNvGrpSpPr/>
+              <p:nvPr/>
+            </p:nvGrpSpPr>
+            <p:grpSpPr>
+              <a:xfrm>
+                <a:off x="8365690" y="2911597"/>
+                <a:ext cx="962406" cy="824502"/>
+                <a:chOff x="7953376" y="5039279"/>
+                <a:chExt cx="962406" cy="824502"/>
+              </a:xfrm>
+            </p:grpSpPr>
+            <p:sp>
+              <p:nvSpPr>
+                <p:cNvPr id="421" name="Hexagon 420"/>
+                <p:cNvSpPr/>
+                <p:nvPr/>
+              </p:nvSpPr>
+              <p:spPr>
+                <a:xfrm>
+                  <a:off x="7953376" y="5039279"/>
+                  <a:ext cx="962406" cy="824502"/>
+                </a:xfrm>
+                <a:prstGeom prst="hexagon">
+                  <a:avLst/>
+                </a:prstGeom>
+                <a:solidFill>
+                  <a:schemeClr val="accent6">
+                    <a:lumMod val="40000"/>
+                    <a:lumOff val="60000"/>
+                  </a:schemeClr>
+                </a:solidFill>
+                <a:ln>
+                  <a:noFill/>
+                </a:ln>
+              </p:spPr>
+              <p:style>
+                <a:lnRef idx="2">
+                  <a:schemeClr val="accent1">
+                    <a:shade val="50000"/>
+                  </a:schemeClr>
+                </a:lnRef>
+                <a:fillRef idx="1">
+                  <a:schemeClr val="accent1"/>
+                </a:fillRef>
+                <a:effectRef idx="0">
+                  <a:schemeClr val="accent1"/>
+                </a:effectRef>
+                <a:fontRef idx="minor">
+                  <a:schemeClr val="lt1"/>
+                </a:fontRef>
+              </p:style>
+              <p:txBody>
+                <a:bodyPr wrap="none" rtlCol="0" anchor="ctr"/>
+                <a:lstStyle/>
+                <a:p>
+                  <a:pPr algn="ctr"/>
+                  <a:endParaRPr lang="en-US" sz="1400" smtClean="0">
+                    <a:solidFill>
+                      <a:schemeClr val="tx1">
+                        <a:lumMod val="85000"/>
+                        <a:lumOff val="15000"/>
+                      </a:schemeClr>
+                    </a:solidFill>
+                  </a:endParaRPr>
+                </a:p>
+              </p:txBody>
+            </p:sp>
+            <p:grpSp>
+              <p:nvGrpSpPr>
+                <p:cNvPr id="422" name="Group 421"/>
+                <p:cNvGrpSpPr/>
+                <p:nvPr/>
+              </p:nvGrpSpPr>
+              <p:grpSpPr>
+                <a:xfrm>
+                  <a:off x="8097919" y="5098330"/>
+                  <a:ext cx="673321" cy="706400"/>
+                  <a:chOff x="6870571" y="4152548"/>
+                  <a:chExt cx="673321" cy="706400"/>
+                </a:xfrm>
+              </p:grpSpPr>
+              <p:pic>
+                <p:nvPicPr>
+                  <p:cNvPr id="423" name="pasted-image.pdf" descr="pasted-image.pdf"/>
+                  <p:cNvPicPr>
+                    <a:picLocks noChangeAspect="1"/>
+                  </p:cNvPicPr>
+                  <p:nvPr/>
+                </p:nvPicPr>
+                <p:blipFill>
+                  <a:blip r:embed="rId12">
+                    <a:extLst>
+                      <a:ext uri="{BEBA8EAE-BF5A-486C-A8C5-ECC9F3942E4B}">
+                        <a14:imgProps xmlns:a14="http://schemas.microsoft.com/office/drawing/2010/main">
+                          <a14:imgLayer r:embed="rId13">
+                            <a14:imgEffect>
+                              <a14:colorTemperature colorTemp="5093"/>
+                            </a14:imgEffect>
+                          </a14:imgLayer>
+                        </a14:imgProps>
+                      </a:ext>
+                    </a:extLst>
+                  </a:blip>
+                  <a:stretch>
+                    <a:fillRect/>
+                  </a:stretch>
+                </p:blipFill>
+                <p:spPr>
+                  <a:xfrm>
+                    <a:off x="7009377" y="4152548"/>
+                    <a:ext cx="534515" cy="549875"/>
+                  </a:xfrm>
+                  <a:prstGeom prst="rect">
+                    <a:avLst/>
+                  </a:prstGeom>
+                  <a:ln w="12700" cap="flat">
+                    <a:noFill/>
+                    <a:miter lim="400000"/>
+                  </a:ln>
+                  <a:effectLst>
+                    <a:outerShdw blurRad="25400" dist="25400" dir="2700000" algn="tl" rotWithShape="0">
+                      <a:prstClr val="black">
+                        <a:alpha val="40000"/>
+                      </a:prstClr>
+                    </a:outerShdw>
+                  </a:effectLst>
+                </p:spPr>
+              </p:pic>
+              <p:pic>
+                <p:nvPicPr>
+                  <p:cNvPr id="424" name="pasted-image.pdf" descr="pasted-image.pdf"/>
+                  <p:cNvPicPr>
+                    <a:picLocks noChangeAspect="1"/>
+                  </p:cNvPicPr>
+                  <p:nvPr/>
+                </p:nvPicPr>
+                <p:blipFill>
+                  <a:blip r:embed="rId12">
+                    <a:extLst>
+                      <a:ext uri="{BEBA8EAE-BF5A-486C-A8C5-ECC9F3942E4B}">
+                        <a14:imgProps xmlns:a14="http://schemas.microsoft.com/office/drawing/2010/main">
+                          <a14:imgLayer r:embed="rId13">
+                            <a14:imgEffect>
+                              <a14:colorTemperature colorTemp="5093"/>
+                            </a14:imgEffect>
+                          </a14:imgLayer>
+                        </a14:imgProps>
+                      </a:ext>
+                    </a:extLst>
+                  </a:blip>
+                  <a:stretch>
+                    <a:fillRect/>
+                  </a:stretch>
+                </p:blipFill>
+                <p:spPr>
+                  <a:xfrm>
+                    <a:off x="6949332" y="4228748"/>
+                    <a:ext cx="534515" cy="549875"/>
+                  </a:xfrm>
+                  <a:prstGeom prst="rect">
+                    <a:avLst/>
+                  </a:prstGeom>
+                  <a:ln w="12700" cap="flat">
+                    <a:noFill/>
+                    <a:miter lim="400000"/>
+                  </a:ln>
+                  <a:effectLst>
+                    <a:outerShdw blurRad="25400" dist="25400" dir="2700000" algn="tl" rotWithShape="0">
+                      <a:prstClr val="black">
+                        <a:alpha val="40000"/>
+                      </a:prstClr>
+                    </a:outerShdw>
+                  </a:effectLst>
+                </p:spPr>
+              </p:pic>
+              <p:pic>
+                <p:nvPicPr>
+                  <p:cNvPr id="425" name="pasted-image.pdf" descr="pasted-image.pdf"/>
+                  <p:cNvPicPr>
+                    <a:picLocks noChangeAspect="1"/>
+                  </p:cNvPicPr>
+                  <p:nvPr/>
+                </p:nvPicPr>
+                <p:blipFill>
+                  <a:blip r:embed="rId12">
+                    <a:extLst>
+                      <a:ext uri="{BEBA8EAE-BF5A-486C-A8C5-ECC9F3942E4B}">
+                        <a14:imgProps xmlns:a14="http://schemas.microsoft.com/office/drawing/2010/main">
+                          <a14:imgLayer r:embed="rId13">
+                            <a14:imgEffect>
+                              <a14:colorTemperature colorTemp="5093"/>
+                            </a14:imgEffect>
+                          </a14:imgLayer>
+                        </a14:imgProps>
+                      </a:ext>
+                    </a:extLst>
+                  </a:blip>
+                  <a:stretch>
+                    <a:fillRect/>
+                  </a:stretch>
+                </p:blipFill>
+                <p:spPr>
+                  <a:xfrm>
+                    <a:off x="6870571" y="4309073"/>
+                    <a:ext cx="534515" cy="549875"/>
+                  </a:xfrm>
+                  <a:prstGeom prst="rect">
+                    <a:avLst/>
+                  </a:prstGeom>
+                  <a:ln w="12700" cap="flat">
+                    <a:noFill/>
+                    <a:miter lim="400000"/>
+                  </a:ln>
+                  <a:effectLst>
+                    <a:outerShdw blurRad="25400" dist="25400" dir="2700000" algn="tl" rotWithShape="0">
+                      <a:prstClr val="black">
+                        <a:alpha val="40000"/>
+                      </a:prstClr>
+                    </a:outerShdw>
+                  </a:effectLst>
+                </p:spPr>
+              </p:pic>
+            </p:grpSp>
+          </p:grpSp>
+          <p:pic>
+            <p:nvPicPr>
+              <p:cNvPr id="426" name="Picture 425"/>
+              <p:cNvPicPr>
+                <a:picLocks noChangeAspect="1"/>
+              </p:cNvPicPr>
+              <p:nvPr/>
+            </p:nvPicPr>
+            <p:blipFill>
+              <a:blip r:embed="rId14">
+                <a:extLst>
+                  <a:ext uri="{28A0092B-C50C-407E-A947-70E740481C1C}">
+                    <a14:useLocalDpi xmlns:a14="http://schemas.microsoft.com/office/drawing/2010/main" val="0"/>
+                  </a:ext>
+                </a:extLst>
+              </a:blip>
+              <a:stretch>
+                <a:fillRect/>
+              </a:stretch>
+            </p:blipFill>
+            <p:spPr>
+              <a:xfrm rot="189821">
+                <a:off x="8612899" y="3244645"/>
+                <a:ext cx="324471" cy="324471"/>
+              </a:xfrm>
+              <a:prstGeom prst="rect">
+                <a:avLst/>
+              </a:prstGeom>
+            </p:spPr>
+          </p:pic>
+        </p:grpSp>
+        <p:grpSp>
+          <p:nvGrpSpPr>
+            <p:cNvPr id="1052" name="Group 1051"/>
+            <p:cNvGrpSpPr/>
+            <p:nvPr/>
+          </p:nvGrpSpPr>
+          <p:grpSpPr>
+            <a:xfrm>
+              <a:off x="6191121" y="2267649"/>
+              <a:ext cx="962406" cy="824502"/>
+              <a:chOff x="5029143" y="5373267"/>
+              <a:chExt cx="962406" cy="824502"/>
+            </a:xfrm>
+            <a:effectLst>
+              <a:outerShdw blurRad="12700" dist="12700" dir="2700000" algn="tl" rotWithShape="0">
+                <a:prstClr val="black">
+                  <a:alpha val="40000"/>
+                </a:prstClr>
+              </a:outerShdw>
+            </a:effectLst>
+          </p:grpSpPr>
+          <p:sp>
+            <p:nvSpPr>
+              <p:cNvPr id="437" name="Hexagon 436"/>
+              <p:cNvSpPr/>
+              <p:nvPr/>
+            </p:nvSpPr>
+            <p:spPr>
+              <a:xfrm>
+                <a:off x="5029143" y="5373267"/>
+                <a:ext cx="962406" cy="824502"/>
+              </a:xfrm>
+              <a:prstGeom prst="hexagon">
+                <a:avLst/>
+              </a:prstGeom>
+              <a:solidFill>
+                <a:schemeClr val="accent6">
+                  <a:lumMod val="40000"/>
+                  <a:lumOff val="60000"/>
+                </a:schemeClr>
+              </a:solidFill>
+              <a:ln>
+                <a:noFill/>
+              </a:ln>
+            </p:spPr>
+            <p:style>
+              <a:lnRef idx="2">
+                <a:schemeClr val="accent1">
+                  <a:shade val="50000"/>
+                </a:schemeClr>
+              </a:lnRef>
+              <a:fillRef idx="1">
+                <a:schemeClr val="accent1"/>
+              </a:fillRef>
+              <a:effectRef idx="0">
+                <a:schemeClr val="accent1"/>
+              </a:effectRef>
+              <a:fontRef idx="minor">
+                <a:schemeClr val="lt1"/>
+              </a:fontRef>
+            </p:style>
+            <p:txBody>
+              <a:bodyPr wrap="none" rtlCol="0" anchor="ctr"/>
+              <a:lstStyle/>
+              <a:p>
+                <a:pPr algn="ctr"/>
+                <a:endParaRPr lang="en-US" sz="1400" smtClean="0">
+                  <a:solidFill>
+                    <a:schemeClr val="tx1">
+                      <a:lumMod val="85000"/>
+                      <a:lumOff val="15000"/>
+                    </a:schemeClr>
+                  </a:solidFill>
+                </a:endParaRPr>
+              </a:p>
+            </p:txBody>
+          </p:sp>
+          <p:grpSp>
+            <p:nvGrpSpPr>
+              <p:cNvPr id="1043" name="Group 1042"/>
+              <p:cNvGrpSpPr/>
+              <p:nvPr/>
+            </p:nvGrpSpPr>
+            <p:grpSpPr>
+              <a:xfrm>
+                <a:off x="5173685" y="5432318"/>
+                <a:ext cx="673321" cy="706400"/>
+                <a:chOff x="6587851" y="4236330"/>
+                <a:chExt cx="673321" cy="706400"/>
+              </a:xfrm>
+            </p:grpSpPr>
+            <p:pic>
+              <p:nvPicPr>
+                <p:cNvPr id="346" name="pasted-image.pdf" descr="pasted-image.pdf"/>
+                <p:cNvPicPr>
+                  <a:picLocks noChangeAspect="1"/>
+                </p:cNvPicPr>
+                <p:nvPr/>
+              </p:nvPicPr>
+              <p:blipFill>
+                <a:blip r:embed="rId12">
+                  <a:extLst>
+                    <a:ext uri="{BEBA8EAE-BF5A-486C-A8C5-ECC9F3942E4B}">
+                      <a14:imgProps xmlns:a14="http://schemas.microsoft.com/office/drawing/2010/main">
+                        <a14:imgLayer r:embed="rId13">
+                          <a14:imgEffect>
+                            <a14:colorTemperature colorTemp="5093"/>
+                          </a14:imgEffect>
+                        </a14:imgLayer>
+                      </a14:imgProps>
+                    </a:ext>
+                  </a:extLst>
+                </a:blip>
+                <a:stretch>
+                  <a:fillRect/>
+                </a:stretch>
+              </p:blipFill>
+              <p:spPr>
+                <a:xfrm>
+                  <a:off x="6726657" y="4236330"/>
+                  <a:ext cx="534515" cy="549875"/>
+                </a:xfrm>
+                <a:prstGeom prst="rect">
+                  <a:avLst/>
+                </a:prstGeom>
+                <a:ln w="12700" cap="flat">
+                  <a:noFill/>
+                  <a:miter lim="400000"/>
+                </a:ln>
+                <a:effectLst>
+                  <a:outerShdw blurRad="25400" dist="25400" dir="2700000" algn="tl" rotWithShape="0">
+                    <a:prstClr val="black">
+                      <a:alpha val="40000"/>
+                    </a:prstClr>
+                  </a:outerShdw>
+                </a:effectLst>
+              </p:spPr>
+            </p:pic>
+            <p:pic>
+              <p:nvPicPr>
+                <p:cNvPr id="347" name="pasted-image.pdf" descr="pasted-image.pdf"/>
+                <p:cNvPicPr>
+                  <a:picLocks noChangeAspect="1"/>
+                </p:cNvPicPr>
+                <p:nvPr/>
+              </p:nvPicPr>
+              <p:blipFill>
+                <a:blip r:embed="rId12">
+                  <a:extLst>
+                    <a:ext uri="{BEBA8EAE-BF5A-486C-A8C5-ECC9F3942E4B}">
+                      <a14:imgProps xmlns:a14="http://schemas.microsoft.com/office/drawing/2010/main">
+                        <a14:imgLayer r:embed="rId13">
+                          <a14:imgEffect>
+                            <a14:colorTemperature colorTemp="5093"/>
+                          </a14:imgEffect>
+                        </a14:imgLayer>
+                      </a14:imgProps>
+                    </a:ext>
+                  </a:extLst>
+                </a:blip>
+                <a:stretch>
+                  <a:fillRect/>
+                </a:stretch>
+              </p:blipFill>
+              <p:spPr>
+                <a:xfrm>
+                  <a:off x="6666612" y="4312530"/>
+                  <a:ext cx="534515" cy="549875"/>
+                </a:xfrm>
+                <a:prstGeom prst="rect">
+                  <a:avLst/>
+                </a:prstGeom>
+                <a:ln w="12700" cap="flat">
+                  <a:noFill/>
+                  <a:miter lim="400000"/>
+                </a:ln>
+                <a:effectLst>
+                  <a:outerShdw blurRad="25400" dist="25400" dir="2700000" algn="tl" rotWithShape="0">
+                    <a:prstClr val="black">
+                      <a:alpha val="40000"/>
+                    </a:prstClr>
+                  </a:outerShdw>
+                </a:effectLst>
+              </p:spPr>
+            </p:pic>
+            <p:pic>
+              <p:nvPicPr>
+                <p:cNvPr id="348" name="pasted-image.pdf" descr="pasted-image.pdf"/>
+                <p:cNvPicPr>
+                  <a:picLocks noChangeAspect="1"/>
+                </p:cNvPicPr>
+                <p:nvPr/>
+              </p:nvPicPr>
+              <p:blipFill>
+                <a:blip r:embed="rId12">
+                  <a:extLst>
+                    <a:ext uri="{BEBA8EAE-BF5A-486C-A8C5-ECC9F3942E4B}">
+                      <a14:imgProps xmlns:a14="http://schemas.microsoft.com/office/drawing/2010/main">
+                        <a14:imgLayer r:embed="rId13">
+                          <a14:imgEffect>
+                            <a14:colorTemperature colorTemp="5093"/>
+                          </a14:imgEffect>
+                        </a14:imgLayer>
+                      </a14:imgProps>
+                    </a:ext>
+                  </a:extLst>
+                </a:blip>
+                <a:stretch>
+                  <a:fillRect/>
+                </a:stretch>
+              </p:blipFill>
+              <p:spPr>
+                <a:xfrm>
+                  <a:off x="6587851" y="4392855"/>
+                  <a:ext cx="534515" cy="549875"/>
+                </a:xfrm>
+                <a:prstGeom prst="rect">
+                  <a:avLst/>
+                </a:prstGeom>
+                <a:ln w="12700" cap="flat">
+                  <a:noFill/>
+                  <a:miter lim="400000"/>
+                </a:ln>
+                <a:effectLst>
+                  <a:outerShdw blurRad="25400" dist="25400" dir="2700000" algn="tl" rotWithShape="0">
+                    <a:prstClr val="black">
+                      <a:alpha val="40000"/>
+                    </a:prstClr>
+                  </a:outerShdw>
+                </a:effectLst>
+              </p:spPr>
+            </p:pic>
+            <p:sp>
+              <p:nvSpPr>
+                <p:cNvPr id="362" name="Hexagon 1037"/>
+                <p:cNvSpPr/>
+                <p:nvPr/>
+              </p:nvSpPr>
+              <p:spPr>
+                <a:xfrm rot="5400000">
+                  <a:off x="6704130" y="4540500"/>
+                  <a:ext cx="303491" cy="275941"/>
+                </a:xfrm>
+                <a:custGeom>
+                  <a:avLst/>
+                  <a:gdLst>
+                    <a:gd name="connsiteX0" fmla="*/ 0 w 1364847"/>
+                    <a:gd name="connsiteY0" fmla="*/ 612107 h 1224213"/>
+                    <a:gd name="connsiteX1" fmla="*/ 306053 w 1364847"/>
+                    <a:gd name="connsiteY1" fmla="*/ 0 h 1224213"/>
+                    <a:gd name="connsiteX2" fmla="*/ 1058794 w 1364847"/>
+                    <a:gd name="connsiteY2" fmla="*/ 0 h 1224213"/>
+                    <a:gd name="connsiteX3" fmla="*/ 1364847 w 1364847"/>
+                    <a:gd name="connsiteY3" fmla="*/ 612107 h 1224213"/>
+                    <a:gd name="connsiteX4" fmla="*/ 1058794 w 1364847"/>
+                    <a:gd name="connsiteY4" fmla="*/ 1224213 h 1224213"/>
+                    <a:gd name="connsiteX5" fmla="*/ 306053 w 1364847"/>
+                    <a:gd name="connsiteY5" fmla="*/ 1224213 h 1224213"/>
+                    <a:gd name="connsiteX6" fmla="*/ 0 w 1364847"/>
+                    <a:gd name="connsiteY6" fmla="*/ 612107 h 1224213"/>
+                    <a:gd name="connsiteX0" fmla="*/ 0 w 1364847"/>
+                    <a:gd name="connsiteY0" fmla="*/ 612107 h 1236913"/>
+                    <a:gd name="connsiteX1" fmla="*/ 306053 w 1364847"/>
+                    <a:gd name="connsiteY1" fmla="*/ 0 h 1236913"/>
+                    <a:gd name="connsiteX2" fmla="*/ 1058794 w 1364847"/>
+                    <a:gd name="connsiteY2" fmla="*/ 0 h 1236913"/>
+                    <a:gd name="connsiteX3" fmla="*/ 1364847 w 1364847"/>
+                    <a:gd name="connsiteY3" fmla="*/ 612107 h 1236913"/>
+                    <a:gd name="connsiteX4" fmla="*/ 1058794 w 1364847"/>
+                    <a:gd name="connsiteY4" fmla="*/ 1224213 h 1236913"/>
+                    <a:gd name="connsiteX5" fmla="*/ 356853 w 1364847"/>
+                    <a:gd name="connsiteY5" fmla="*/ 1236913 h 1236913"/>
+                    <a:gd name="connsiteX6" fmla="*/ 0 w 1364847"/>
+                    <a:gd name="connsiteY6" fmla="*/ 612107 h 1236913"/>
+                    <a:gd name="connsiteX0" fmla="*/ 0 w 1364847"/>
+                    <a:gd name="connsiteY0" fmla="*/ 612107 h 1230563"/>
+                    <a:gd name="connsiteX1" fmla="*/ 306053 w 1364847"/>
+                    <a:gd name="connsiteY1" fmla="*/ 0 h 1230563"/>
+                    <a:gd name="connsiteX2" fmla="*/ 1058794 w 1364847"/>
+                    <a:gd name="connsiteY2" fmla="*/ 0 h 1230563"/>
+                    <a:gd name="connsiteX3" fmla="*/ 1364847 w 1364847"/>
+                    <a:gd name="connsiteY3" fmla="*/ 612107 h 1230563"/>
+                    <a:gd name="connsiteX4" fmla="*/ 1058794 w 1364847"/>
+                    <a:gd name="connsiteY4" fmla="*/ 1224213 h 1230563"/>
+                    <a:gd name="connsiteX5" fmla="*/ 331453 w 1364847"/>
+                    <a:gd name="connsiteY5" fmla="*/ 1230563 h 1230563"/>
+                    <a:gd name="connsiteX6" fmla="*/ 0 w 1364847"/>
+                    <a:gd name="connsiteY6" fmla="*/ 612107 h 1230563"/>
+                    <a:gd name="connsiteX0" fmla="*/ 0 w 1364847"/>
+                    <a:gd name="connsiteY0" fmla="*/ 612107 h 1249613"/>
+                    <a:gd name="connsiteX1" fmla="*/ 306053 w 1364847"/>
+                    <a:gd name="connsiteY1" fmla="*/ 0 h 1249613"/>
+                    <a:gd name="connsiteX2" fmla="*/ 1058794 w 1364847"/>
+                    <a:gd name="connsiteY2" fmla="*/ 0 h 1249613"/>
+                    <a:gd name="connsiteX3" fmla="*/ 1364847 w 1364847"/>
+                    <a:gd name="connsiteY3" fmla="*/ 612107 h 1249613"/>
+                    <a:gd name="connsiteX4" fmla="*/ 1014344 w 1364847"/>
+                    <a:gd name="connsiteY4" fmla="*/ 1249613 h 1249613"/>
+                    <a:gd name="connsiteX5" fmla="*/ 331453 w 1364847"/>
+                    <a:gd name="connsiteY5" fmla="*/ 1230563 h 1249613"/>
+                    <a:gd name="connsiteX6" fmla="*/ 0 w 1364847"/>
+                    <a:gd name="connsiteY6" fmla="*/ 612107 h 1249613"/>
+                    <a:gd name="connsiteX0" fmla="*/ 0 w 1364847"/>
+                    <a:gd name="connsiteY0" fmla="*/ 612107 h 1249613"/>
+                    <a:gd name="connsiteX1" fmla="*/ 306053 w 1364847"/>
+                    <a:gd name="connsiteY1" fmla="*/ 0 h 1249613"/>
+                    <a:gd name="connsiteX2" fmla="*/ 1058794 w 1364847"/>
+                    <a:gd name="connsiteY2" fmla="*/ 0 h 1249613"/>
+                    <a:gd name="connsiteX3" fmla="*/ 1364847 w 1364847"/>
+                    <a:gd name="connsiteY3" fmla="*/ 643857 h 1249613"/>
+                    <a:gd name="connsiteX4" fmla="*/ 1014344 w 1364847"/>
+                    <a:gd name="connsiteY4" fmla="*/ 1249613 h 1249613"/>
+                    <a:gd name="connsiteX5" fmla="*/ 331453 w 1364847"/>
+                    <a:gd name="connsiteY5" fmla="*/ 1230563 h 1249613"/>
+                    <a:gd name="connsiteX6" fmla="*/ 0 w 1364847"/>
+                    <a:gd name="connsiteY6" fmla="*/ 612107 h 1249613"/>
+                    <a:gd name="connsiteX0" fmla="*/ 0 w 1364847"/>
+                    <a:gd name="connsiteY0" fmla="*/ 637507 h 1275013"/>
+                    <a:gd name="connsiteX1" fmla="*/ 306053 w 1364847"/>
+                    <a:gd name="connsiteY1" fmla="*/ 25400 h 1275013"/>
+                    <a:gd name="connsiteX2" fmla="*/ 1007994 w 1364847"/>
+                    <a:gd name="connsiteY2" fmla="*/ 0 h 1275013"/>
+                    <a:gd name="connsiteX3" fmla="*/ 1364847 w 1364847"/>
+                    <a:gd name="connsiteY3" fmla="*/ 669257 h 1275013"/>
+                    <a:gd name="connsiteX4" fmla="*/ 1014344 w 1364847"/>
+                    <a:gd name="connsiteY4" fmla="*/ 1275013 h 1275013"/>
+                    <a:gd name="connsiteX5" fmla="*/ 331453 w 1364847"/>
+                    <a:gd name="connsiteY5" fmla="*/ 1255963 h 1275013"/>
+                    <a:gd name="connsiteX6" fmla="*/ 0 w 1364847"/>
+                    <a:gd name="connsiteY6" fmla="*/ 637507 h 1275013"/>
+                    <a:gd name="connsiteX0" fmla="*/ 0 w 1364847"/>
+                    <a:gd name="connsiteY0" fmla="*/ 643857 h 1281363"/>
+                    <a:gd name="connsiteX1" fmla="*/ 344153 w 1364847"/>
+                    <a:gd name="connsiteY1" fmla="*/ 0 h 1281363"/>
+                    <a:gd name="connsiteX2" fmla="*/ 1007994 w 1364847"/>
+                    <a:gd name="connsiteY2" fmla="*/ 6350 h 1281363"/>
+                    <a:gd name="connsiteX3" fmla="*/ 1364847 w 1364847"/>
+                    <a:gd name="connsiteY3" fmla="*/ 675607 h 1281363"/>
+                    <a:gd name="connsiteX4" fmla="*/ 1014344 w 1364847"/>
+                    <a:gd name="connsiteY4" fmla="*/ 1281363 h 1281363"/>
+                    <a:gd name="connsiteX5" fmla="*/ 331453 w 1364847"/>
+                    <a:gd name="connsiteY5" fmla="*/ 1262313 h 1281363"/>
+                    <a:gd name="connsiteX6" fmla="*/ 0 w 1364847"/>
+                    <a:gd name="connsiteY6" fmla="*/ 643857 h 1281363"/>
+                    <a:gd name="connsiteX0" fmla="*/ 0 w 1364847"/>
+                    <a:gd name="connsiteY0" fmla="*/ 643857 h 1281363"/>
+                    <a:gd name="connsiteX1" fmla="*/ 344153 w 1364847"/>
+                    <a:gd name="connsiteY1" fmla="*/ 0 h 1281363"/>
+                    <a:gd name="connsiteX2" fmla="*/ 1007994 w 1364847"/>
+                    <a:gd name="connsiteY2" fmla="*/ 6350 h 1281363"/>
+                    <a:gd name="connsiteX3" fmla="*/ 1364847 w 1364847"/>
+                    <a:gd name="connsiteY3" fmla="*/ 675607 h 1281363"/>
+                    <a:gd name="connsiteX4" fmla="*/ 1014344 w 1364847"/>
+                    <a:gd name="connsiteY4" fmla="*/ 1281363 h 1281363"/>
+                    <a:gd name="connsiteX5" fmla="*/ 369553 w 1364847"/>
+                    <a:gd name="connsiteY5" fmla="*/ 1275013 h 1281363"/>
+                    <a:gd name="connsiteX6" fmla="*/ 0 w 1364847"/>
+                    <a:gd name="connsiteY6" fmla="*/ 643857 h 1281363"/>
+                    <a:gd name="connsiteX0" fmla="*/ 0 w 1390247"/>
+                    <a:gd name="connsiteY0" fmla="*/ 643857 h 1281363"/>
+                    <a:gd name="connsiteX1" fmla="*/ 344153 w 1390247"/>
+                    <a:gd name="connsiteY1" fmla="*/ 0 h 1281363"/>
+                    <a:gd name="connsiteX2" fmla="*/ 1007994 w 1390247"/>
+                    <a:gd name="connsiteY2" fmla="*/ 6350 h 1281363"/>
+                    <a:gd name="connsiteX3" fmla="*/ 1390247 w 1390247"/>
+                    <a:gd name="connsiteY3" fmla="*/ 656557 h 1281363"/>
+                    <a:gd name="connsiteX4" fmla="*/ 1014344 w 1390247"/>
+                    <a:gd name="connsiteY4" fmla="*/ 1281363 h 1281363"/>
+                    <a:gd name="connsiteX5" fmla="*/ 369553 w 1390247"/>
+                    <a:gd name="connsiteY5" fmla="*/ 1275013 h 1281363"/>
+                    <a:gd name="connsiteX6" fmla="*/ 0 w 1390247"/>
+                    <a:gd name="connsiteY6" fmla="*/ 643857 h 1281363"/>
+                    <a:gd name="connsiteX0" fmla="*/ 0 w 1390247"/>
+                    <a:gd name="connsiteY0" fmla="*/ 643857 h 1281363"/>
+                    <a:gd name="connsiteX1" fmla="*/ 344153 w 1390247"/>
+                    <a:gd name="connsiteY1" fmla="*/ 0 h 1281363"/>
+                    <a:gd name="connsiteX2" fmla="*/ 1007994 w 1390247"/>
+                    <a:gd name="connsiteY2" fmla="*/ 6350 h 1281363"/>
+                    <a:gd name="connsiteX3" fmla="*/ 1390247 w 1390247"/>
+                    <a:gd name="connsiteY3" fmla="*/ 656557 h 1281363"/>
+                    <a:gd name="connsiteX4" fmla="*/ 1014344 w 1390247"/>
+                    <a:gd name="connsiteY4" fmla="*/ 1281363 h 1281363"/>
+                    <a:gd name="connsiteX5" fmla="*/ 331453 w 1390247"/>
+                    <a:gd name="connsiteY5" fmla="*/ 1275013 h 1281363"/>
+                    <a:gd name="connsiteX6" fmla="*/ 0 w 1390247"/>
+                    <a:gd name="connsiteY6" fmla="*/ 643857 h 1281363"/>
+                    <a:gd name="connsiteX0" fmla="*/ 0 w 1409297"/>
+                    <a:gd name="connsiteY0" fmla="*/ 656557 h 1281363"/>
+                    <a:gd name="connsiteX1" fmla="*/ 363203 w 1409297"/>
+                    <a:gd name="connsiteY1" fmla="*/ 0 h 1281363"/>
+                    <a:gd name="connsiteX2" fmla="*/ 1027044 w 1409297"/>
+                    <a:gd name="connsiteY2" fmla="*/ 6350 h 1281363"/>
+                    <a:gd name="connsiteX3" fmla="*/ 1409297 w 1409297"/>
+                    <a:gd name="connsiteY3" fmla="*/ 656557 h 1281363"/>
+                    <a:gd name="connsiteX4" fmla="*/ 1033394 w 1409297"/>
+                    <a:gd name="connsiteY4" fmla="*/ 1281363 h 1281363"/>
+                    <a:gd name="connsiteX5" fmla="*/ 350503 w 1409297"/>
+                    <a:gd name="connsiteY5" fmla="*/ 1275013 h 1281363"/>
+                    <a:gd name="connsiteX6" fmla="*/ 0 w 1409297"/>
+                    <a:gd name="connsiteY6" fmla="*/ 656557 h 1281363"/>
+                    <a:gd name="connsiteX0" fmla="*/ 0 w 1409297"/>
+                    <a:gd name="connsiteY0" fmla="*/ 656557 h 1281363"/>
+                    <a:gd name="connsiteX1" fmla="*/ 363203 w 1409297"/>
+                    <a:gd name="connsiteY1" fmla="*/ 0 h 1281363"/>
+                    <a:gd name="connsiteX2" fmla="*/ 1046094 w 1409297"/>
+                    <a:gd name="connsiteY2" fmla="*/ 19050 h 1281363"/>
+                    <a:gd name="connsiteX3" fmla="*/ 1409297 w 1409297"/>
+                    <a:gd name="connsiteY3" fmla="*/ 656557 h 1281363"/>
+                    <a:gd name="connsiteX4" fmla="*/ 1033394 w 1409297"/>
+                    <a:gd name="connsiteY4" fmla="*/ 1281363 h 1281363"/>
+                    <a:gd name="connsiteX5" fmla="*/ 350503 w 1409297"/>
+                    <a:gd name="connsiteY5" fmla="*/ 1275013 h 1281363"/>
+                    <a:gd name="connsiteX6" fmla="*/ 0 w 1409297"/>
+                    <a:gd name="connsiteY6" fmla="*/ 656557 h 1281363"/>
+                    <a:gd name="connsiteX0" fmla="*/ 0 w 1409297"/>
+                    <a:gd name="connsiteY0" fmla="*/ 656557 h 1281363"/>
+                    <a:gd name="connsiteX1" fmla="*/ 363203 w 1409297"/>
+                    <a:gd name="connsiteY1" fmla="*/ 0 h 1281363"/>
+                    <a:gd name="connsiteX2" fmla="*/ 1052444 w 1409297"/>
+                    <a:gd name="connsiteY2" fmla="*/ 6350 h 1281363"/>
+                    <a:gd name="connsiteX3" fmla="*/ 1409297 w 1409297"/>
+                    <a:gd name="connsiteY3" fmla="*/ 656557 h 1281363"/>
+                    <a:gd name="connsiteX4" fmla="*/ 1033394 w 1409297"/>
+                    <a:gd name="connsiteY4" fmla="*/ 1281363 h 1281363"/>
+                    <a:gd name="connsiteX5" fmla="*/ 350503 w 1409297"/>
+                    <a:gd name="connsiteY5" fmla="*/ 1275013 h 1281363"/>
+                    <a:gd name="connsiteX6" fmla="*/ 0 w 1409297"/>
+                    <a:gd name="connsiteY6" fmla="*/ 656557 h 1281363"/>
+                  </a:gdLst>
+                  <a:ahLst/>
+                  <a:cxnLst>
+                    <a:cxn ang="0">
+                      <a:pos x="connsiteX0" y="connsiteY0"/>
+                    </a:cxn>
+                    <a:cxn ang="0">
+                      <a:pos x="connsiteX1" y="connsiteY1"/>
+                    </a:cxn>
+                    <a:cxn ang="0">
+                      <a:pos x="connsiteX2" y="connsiteY2"/>
+                    </a:cxn>
+                    <a:cxn ang="0">
+                      <a:pos x="connsiteX3" y="connsiteY3"/>
+                    </a:cxn>
+                    <a:cxn ang="0">
+                      <a:pos x="connsiteX4" y="connsiteY4"/>
+                    </a:cxn>
+                    <a:cxn ang="0">
+                      <a:pos x="connsiteX5" y="connsiteY5"/>
+                    </a:cxn>
+                    <a:cxn ang="0">
+                      <a:pos x="connsiteX6" y="connsiteY6"/>
+                    </a:cxn>
+                  </a:cxnLst>
+                  <a:rect l="l" t="t" r="r" b="b"/>
+                  <a:pathLst>
+                    <a:path w="1409297" h="1281363">
+                      <a:moveTo>
+                        <a:pt x="0" y="656557"/>
+                      </a:moveTo>
+                      <a:lnTo>
+                        <a:pt x="363203" y="0"/>
+                      </a:lnTo>
+                      <a:lnTo>
+                        <a:pt x="1052444" y="6350"/>
+                      </a:lnTo>
+                      <a:lnTo>
+                        <a:pt x="1409297" y="656557"/>
+                      </a:lnTo>
+                      <a:lnTo>
+                        <a:pt x="1033394" y="1281363"/>
+                      </a:lnTo>
+                      <a:lnTo>
+                        <a:pt x="350503" y="1275013"/>
+                      </a:lnTo>
+                      <a:lnTo>
+                        <a:pt x="0" y="656557"/>
+                      </a:lnTo>
+                      <a:close/>
+                    </a:path>
+                  </a:pathLst>
+                </a:custGeom>
+                <a:solidFill>
+                  <a:schemeClr val="bg1"/>
+                </a:solidFill>
+                <a:ln>
+                  <a:noFill/>
+                </a:ln>
+              </p:spPr>
+              <p:style>
+                <a:lnRef idx="2">
+                  <a:schemeClr val="accent1">
+                    <a:shade val="50000"/>
+                  </a:schemeClr>
+                </a:lnRef>
+                <a:fillRef idx="1">
+                  <a:schemeClr val="accent1"/>
+                </a:fillRef>
+                <a:effectRef idx="0">
+                  <a:schemeClr val="accent1"/>
+                </a:effectRef>
+                <a:fontRef idx="minor">
+                  <a:schemeClr val="lt1"/>
+                </a:fontRef>
+              </p:style>
+              <p:txBody>
+                <a:bodyPr wrap="none" rtlCol="0" anchor="ctr"/>
+                <a:lstStyle/>
+                <a:p>
+                  <a:pPr algn="ctr"/>
+                  <a:endParaRPr lang="en-US" sz="1400" smtClean="0">
+                    <a:solidFill>
+                      <a:schemeClr val="tx1">
+                        <a:lumMod val="85000"/>
+                        <a:lumOff val="15000"/>
+                      </a:schemeClr>
+                    </a:solidFill>
+                  </a:endParaRPr>
+                </a:p>
+              </p:txBody>
+            </p:sp>
+            <p:pic>
+              <p:nvPicPr>
+                <p:cNvPr id="363" name="Picture 362"/>
+                <p:cNvPicPr>
+                  <a:picLocks noChangeAspect="1"/>
+                </p:cNvPicPr>
+                <p:nvPr/>
+              </p:nvPicPr>
+              <p:blipFill>
+                <a:blip r:embed="rId15">
+                  <a:extLst>
+                    <a:ext uri="{28A0092B-C50C-407E-A947-70E740481C1C}">
+                      <a14:useLocalDpi xmlns:a14="http://schemas.microsoft.com/office/drawing/2010/main" val="0"/>
+                    </a:ext>
+                  </a:extLst>
+                </a:blip>
+                <a:stretch>
+                  <a:fillRect/>
+                </a:stretch>
+              </p:blipFill>
+              <p:spPr>
+                <a:xfrm>
+                  <a:off x="6702294" y="4507799"/>
+                  <a:ext cx="305629" cy="319987"/>
+                </a:xfrm>
+                <a:prstGeom prst="rect">
+                  <a:avLst/>
+                </a:prstGeom>
+                <a:ln>
+                  <a:noFill/>
+                </a:ln>
+              </p:spPr>
+            </p:pic>
+          </p:grpSp>
+        </p:grpSp>
+        <p:sp>
+          <p:nvSpPr>
+            <p:cNvPr id="461" name="Hexagon 460"/>
+            <p:cNvSpPr/>
+            <p:nvPr/>
+          </p:nvSpPr>
+          <p:spPr>
+            <a:xfrm>
+              <a:off x="7008984" y="2715905"/>
+              <a:ext cx="962406" cy="824502"/>
+            </a:xfrm>
+            <a:prstGeom prst="hexagon">
+              <a:avLst/>
+            </a:prstGeom>
+            <a:solidFill>
+              <a:schemeClr val="accent6">
+                <a:lumMod val="40000"/>
+                <a:lumOff val="60000"/>
+              </a:schemeClr>
+            </a:solidFill>
+            <a:ln>
+              <a:noFill/>
+            </a:ln>
+          </p:spPr>
+          <p:style>
+            <a:lnRef idx="2">
+              <a:schemeClr val="accent1">
+                <a:shade val="50000"/>
+              </a:schemeClr>
+            </a:lnRef>
+            <a:fillRef idx="1">
+              <a:schemeClr val="accent1"/>
+            </a:fillRef>
+            <a:effectRef idx="0">
+              <a:schemeClr val="accent1"/>
+            </a:effectRef>
+            <a:fontRef idx="minor">
+              <a:schemeClr val="lt1"/>
+            </a:fontRef>
+          </p:style>
+          <p:txBody>
+            <a:bodyPr wrap="none" rtlCol="0" anchor="ctr"/>
+            <a:lstStyle/>
+            <a:p>
+              <a:pPr algn="ctr"/>
+              <a:endParaRPr lang="en-US" sz="1400" smtClean="0">
+                <a:solidFill>
+                  <a:schemeClr val="tx1">
+                    <a:lumMod val="85000"/>
+                    <a:lumOff val="15000"/>
+                  </a:schemeClr>
+                </a:solidFill>
+              </a:endParaRPr>
+            </a:p>
+          </p:txBody>
+        </p:sp>
+        <p:grpSp>
+          <p:nvGrpSpPr>
+            <p:cNvPr id="484" name="Group 483"/>
+            <p:cNvGrpSpPr/>
+            <p:nvPr/>
+          </p:nvGrpSpPr>
+          <p:grpSpPr>
+            <a:xfrm>
+              <a:off x="7153527" y="2774956"/>
+              <a:ext cx="673321" cy="706400"/>
+              <a:chOff x="7842152" y="3407874"/>
+              <a:chExt cx="673321" cy="706400"/>
+            </a:xfrm>
+          </p:grpSpPr>
+          <p:pic>
+            <p:nvPicPr>
+              <p:cNvPr id="463" name="pasted-image.pdf" descr="pasted-image.pdf"/>
+              <p:cNvPicPr>
+                <a:picLocks noChangeAspect="1"/>
+              </p:cNvPicPr>
+              <p:nvPr/>
+            </p:nvPicPr>
+            <p:blipFill>
+              <a:blip r:embed="rId12">
+                <a:extLst>
+                  <a:ext uri="{BEBA8EAE-BF5A-486C-A8C5-ECC9F3942E4B}">
+                    <a14:imgProps xmlns:a14="http://schemas.microsoft.com/office/drawing/2010/main">
+                      <a14:imgLayer r:embed="rId13">
+                        <a14:imgEffect>
+                          <a14:colorTemperature colorTemp="5093"/>
+                        </a14:imgEffect>
+                      </a14:imgLayer>
+                    </a14:imgProps>
+                  </a:ext>
+                </a:extLst>
+              </a:blip>
+              <a:stretch>
+                <a:fillRect/>
+              </a:stretch>
+            </p:blipFill>
+            <p:spPr>
+              <a:xfrm>
+                <a:off x="7980958" y="3407874"/>
+                <a:ext cx="534515" cy="549875"/>
+              </a:xfrm>
+              <a:prstGeom prst="rect">
+                <a:avLst/>
+              </a:prstGeom>
+              <a:ln w="12700" cap="flat">
+                <a:noFill/>
+                <a:miter lim="400000"/>
+              </a:ln>
+              <a:effectLst>
+                <a:outerShdw blurRad="25400" dist="25400" dir="2700000" algn="tl" rotWithShape="0">
+                  <a:prstClr val="black">
+                    <a:alpha val="40000"/>
+                  </a:prstClr>
+                </a:outerShdw>
+              </a:effectLst>
+            </p:spPr>
+          </p:pic>
+          <p:pic>
+            <p:nvPicPr>
+              <p:cNvPr id="464" name="pasted-image.pdf" descr="pasted-image.pdf"/>
+              <p:cNvPicPr>
+                <a:picLocks noChangeAspect="1"/>
+              </p:cNvPicPr>
+              <p:nvPr/>
+            </p:nvPicPr>
+            <p:blipFill>
+              <a:blip r:embed="rId12">
+                <a:extLst>
+                  <a:ext uri="{BEBA8EAE-BF5A-486C-A8C5-ECC9F3942E4B}">
+                    <a14:imgProps xmlns:a14="http://schemas.microsoft.com/office/drawing/2010/main">
+                      <a14:imgLayer r:embed="rId13">
+                        <a14:imgEffect>
+                          <a14:colorTemperature colorTemp="5093"/>
+                        </a14:imgEffect>
+                      </a14:imgLayer>
+                    </a14:imgProps>
+                  </a:ext>
+                </a:extLst>
+              </a:blip>
+              <a:stretch>
+                <a:fillRect/>
+              </a:stretch>
+            </p:blipFill>
+            <p:spPr>
+              <a:xfrm>
+                <a:off x="7920913" y="3484074"/>
+                <a:ext cx="534515" cy="549875"/>
+              </a:xfrm>
+              <a:prstGeom prst="rect">
+                <a:avLst/>
+              </a:prstGeom>
+              <a:ln w="12700" cap="flat">
+                <a:noFill/>
+                <a:miter lim="400000"/>
+              </a:ln>
+              <a:effectLst>
+                <a:outerShdw blurRad="25400" dist="25400" dir="2700000" algn="tl" rotWithShape="0">
+                  <a:prstClr val="black">
+                    <a:alpha val="40000"/>
+                  </a:prstClr>
+                </a:outerShdw>
+              </a:effectLst>
+            </p:spPr>
+          </p:pic>
+          <p:pic>
+            <p:nvPicPr>
+              <p:cNvPr id="465" name="pasted-image.pdf" descr="pasted-image.pdf"/>
+              <p:cNvPicPr>
+                <a:picLocks noChangeAspect="1"/>
+              </p:cNvPicPr>
+              <p:nvPr/>
+            </p:nvPicPr>
+            <p:blipFill>
+              <a:blip r:embed="rId12">
+                <a:extLst>
+                  <a:ext uri="{BEBA8EAE-BF5A-486C-A8C5-ECC9F3942E4B}">
+                    <a14:imgProps xmlns:a14="http://schemas.microsoft.com/office/drawing/2010/main">
+                      <a14:imgLayer r:embed="rId13">
+                        <a14:imgEffect>
+                          <a14:colorTemperature colorTemp="5093"/>
+                        </a14:imgEffect>
+                      </a14:imgLayer>
+                    </a14:imgProps>
+                  </a:ext>
+                </a:extLst>
+              </a:blip>
+              <a:stretch>
+                <a:fillRect/>
+              </a:stretch>
+            </p:blipFill>
+            <p:spPr>
+              <a:xfrm>
+                <a:off x="7842152" y="3564399"/>
+                <a:ext cx="534515" cy="549875"/>
+              </a:xfrm>
+              <a:prstGeom prst="rect">
+                <a:avLst/>
+              </a:prstGeom>
+              <a:ln w="12700" cap="flat">
+                <a:noFill/>
+                <a:miter lim="400000"/>
+              </a:ln>
+              <a:effectLst>
+                <a:outerShdw blurRad="25400" dist="25400" dir="2700000" algn="tl" rotWithShape="0">
+                  <a:prstClr val="black">
+                    <a:alpha val="40000"/>
+                  </a:prstClr>
+                </a:outerShdw>
+              </a:effectLst>
+            </p:spPr>
+          </p:pic>
+        </p:grpSp>
+      </p:grpSp>
       <p:grpSp>
         <p:nvGrpSpPr>
           <p:cNvPr id="631" name="Group 630"/>
@@ -1828,10 +3904,10 @@
         </p:nvGrpSpPr>
         <p:grpSpPr>
           <a:xfrm>
-            <a:off x="7598416" y="1905000"/>
-            <a:ext cx="1934575" cy="1880187"/>
-            <a:chOff x="9019106" y="1810966"/>
-            <a:chExt cx="1934575" cy="1880187"/>
+            <a:off x="7764408" y="1853613"/>
+            <a:ext cx="1989192" cy="1880187"/>
+            <a:chOff x="8964490" y="1810966"/>
+            <a:chExt cx="1989192" cy="1880187"/>
           </a:xfrm>
         </p:grpSpPr>
         <p:sp>
@@ -1842,8 +3918,8 @@
           </p:nvSpPr>
           <p:spPr>
             <a:xfrm>
-              <a:off x="9019106" y="1810966"/>
-              <a:ext cx="1934575" cy="1880187"/>
+              <a:off x="8964490" y="1810966"/>
+              <a:ext cx="1989192" cy="1880187"/>
             </a:xfrm>
             <a:prstGeom prst="rect">
               <a:avLst/>
@@ -1995,11 +4071,11 @@
                 <p:nvPr/>
               </p:nvPicPr>
               <p:blipFill>
-                <a:blip r:embed="rId3">
+                <a:blip r:embed="rId12">
                   <a:extLst>
                     <a:ext uri="{BEBA8EAE-BF5A-486C-A8C5-ECC9F3942E4B}">
                       <a14:imgProps xmlns:a14="http://schemas.microsoft.com/office/drawing/2010/main">
-                        <a14:imgLayer r:embed="rId4">
+                        <a14:imgLayer r:embed="rId13">
                           <a14:imgEffect>
                             <a14:colorTemperature colorTemp="5093"/>
                           </a14:imgEffect>
@@ -2042,11 +4118,11 @@
                 <p:nvPr/>
               </p:nvPicPr>
               <p:blipFill>
-                <a:blip r:embed="rId3">
+                <a:blip r:embed="rId12">
                   <a:extLst>
                     <a:ext uri="{BEBA8EAE-BF5A-486C-A8C5-ECC9F3942E4B}">
                       <a14:imgProps xmlns:a14="http://schemas.microsoft.com/office/drawing/2010/main">
-                        <a14:imgLayer r:embed="rId4">
+                        <a14:imgLayer r:embed="rId13">
                           <a14:imgEffect>
                             <a14:colorTemperature colorTemp="5093"/>
                           </a14:imgEffect>
@@ -2089,11 +4165,11 @@
                 <p:nvPr/>
               </p:nvPicPr>
               <p:blipFill>
-                <a:blip r:embed="rId3">
+                <a:blip r:embed="rId12">
                   <a:extLst>
                     <a:ext uri="{BEBA8EAE-BF5A-486C-A8C5-ECC9F3942E4B}">
                       <a14:imgProps xmlns:a14="http://schemas.microsoft.com/office/drawing/2010/main">
-                        <a14:imgLayer r:embed="rId4">
+                        <a14:imgLayer r:embed="rId13">
                           <a14:imgEffect>
                             <a14:colorTemperature colorTemp="5093"/>
                           </a14:imgEffect>
@@ -2136,7 +4212,7 @@
                 <p:nvPr/>
               </p:nvPicPr>
               <p:blipFill>
-                <a:blip r:embed="rId5">
+                <a:blip r:embed="rId16">
                   <a:extLst>
                     <a:ext uri="{28A0092B-C50C-407E-A947-70E740481C1C}">
                       <a14:useLocalDpi xmlns:a14="http://schemas.microsoft.com/office/drawing/2010/main" val="0"/>
@@ -2259,11 +4335,11 @@
                 <p:nvPr/>
               </p:nvPicPr>
               <p:blipFill>
-                <a:blip r:embed="rId3">
+                <a:blip r:embed="rId12">
                   <a:extLst>
                     <a:ext uri="{BEBA8EAE-BF5A-486C-A8C5-ECC9F3942E4B}">
                       <a14:imgProps xmlns:a14="http://schemas.microsoft.com/office/drawing/2010/main">
-                        <a14:imgLayer r:embed="rId4">
+                        <a14:imgLayer r:embed="rId13">
                           <a14:imgEffect>
                             <a14:colorTemperature colorTemp="5093"/>
                           </a14:imgEffect>
@@ -2306,11 +4382,11 @@
                 <p:nvPr/>
               </p:nvPicPr>
               <p:blipFill>
-                <a:blip r:embed="rId3">
+                <a:blip r:embed="rId12">
                   <a:extLst>
                     <a:ext uri="{BEBA8EAE-BF5A-486C-A8C5-ECC9F3942E4B}">
                       <a14:imgProps xmlns:a14="http://schemas.microsoft.com/office/drawing/2010/main">
-                        <a14:imgLayer r:embed="rId4">
+                        <a14:imgLayer r:embed="rId13">
                           <a14:imgEffect>
                             <a14:colorTemperature colorTemp="5093"/>
                           </a14:imgEffect>
@@ -2353,11 +4429,11 @@
                 <p:nvPr/>
               </p:nvPicPr>
               <p:blipFill>
-                <a:blip r:embed="rId3">
+                <a:blip r:embed="rId12">
                   <a:extLst>
                     <a:ext uri="{BEBA8EAE-BF5A-486C-A8C5-ECC9F3942E4B}">
                       <a14:imgProps xmlns:a14="http://schemas.microsoft.com/office/drawing/2010/main">
-                        <a14:imgLayer r:embed="rId4">
+                        <a14:imgLayer r:embed="rId13">
                           <a14:imgEffect>
                             <a14:colorTemperature colorTemp="5093"/>
                           </a14:imgEffect>
@@ -2688,7 +4764,7 @@
                 <p:nvPr/>
               </p:nvPicPr>
               <p:blipFill>
-                <a:blip r:embed="rId6">
+                <a:blip r:embed="rId15">
                   <a:extLst>
                     <a:ext uri="{28A0092B-C50C-407E-A947-70E740481C1C}">
                       <a14:useLocalDpi xmlns:a14="http://schemas.microsoft.com/office/drawing/2010/main" val="0"/>
@@ -2828,11 +4904,11 @@
                   <p:nvPr/>
                 </p:nvPicPr>
                 <p:blipFill>
-                  <a:blip r:embed="rId3">
+                  <a:blip r:embed="rId12">
                     <a:extLst>
                       <a:ext uri="{BEBA8EAE-BF5A-486C-A8C5-ECC9F3942E4B}">
                         <a14:imgProps xmlns:a14="http://schemas.microsoft.com/office/drawing/2010/main">
-                          <a14:imgLayer r:embed="rId4">
+                          <a14:imgLayer r:embed="rId13">
                             <a14:imgEffect>
                               <a14:colorTemperature colorTemp="5093"/>
                             </a14:imgEffect>
@@ -2875,11 +4951,11 @@
                   <p:nvPr/>
                 </p:nvPicPr>
                 <p:blipFill>
-                  <a:blip r:embed="rId3">
+                  <a:blip r:embed="rId12">
                     <a:extLst>
                       <a:ext uri="{BEBA8EAE-BF5A-486C-A8C5-ECC9F3942E4B}">
                         <a14:imgProps xmlns:a14="http://schemas.microsoft.com/office/drawing/2010/main">
-                          <a14:imgLayer r:embed="rId4">
+                          <a14:imgLayer r:embed="rId13">
                             <a14:imgEffect>
                               <a14:colorTemperature colorTemp="5093"/>
                             </a14:imgEffect>
@@ -2922,11 +4998,11 @@
                   <p:nvPr/>
                 </p:nvPicPr>
                 <p:blipFill>
-                  <a:blip r:embed="rId3">
+                  <a:blip r:embed="rId12">
                     <a:extLst>
                       <a:ext uri="{BEBA8EAE-BF5A-486C-A8C5-ECC9F3942E4B}">
                         <a14:imgProps xmlns:a14="http://schemas.microsoft.com/office/drawing/2010/main">
-                          <a14:imgLayer r:embed="rId4">
+                          <a14:imgLayer r:embed="rId13">
                             <a14:imgEffect>
                               <a14:colorTemperature colorTemp="5093"/>
                             </a14:imgEffect>
@@ -2971,8 +5047,7 @@
               <p:nvPr/>
             </p:nvPicPr>
             <p:blipFill>
-              <a:blip r:embed="rId7">
-                <a:alphaModFix/>
+              <a:blip r:embed="rId17">
                 <a:extLst>
                   <a:ext uri="{28A0092B-C50C-407E-A947-70E740481C1C}">
                     <a14:useLocalDpi xmlns:a14="http://schemas.microsoft.com/office/drawing/2010/main" val="0"/>
@@ -2991,2087 +5066,6 @@
               <a:prstGeom prst="rect">
                 <a:avLst/>
               </a:prstGeom>
-              <a:effectLst>
-                <a:outerShdw blurRad="50800" dist="50800" dir="5400000" algn="ctr" rotWithShape="0">
-                  <a:srgbClr val="000000"/>
-                </a:outerShdw>
-              </a:effectLst>
-            </p:spPr>
-          </p:pic>
-        </p:grpSp>
-      </p:grpSp>
-      <p:cxnSp>
-        <p:nvCxnSpPr>
-          <p:cNvPr id="615" name="Elbow Connector 614"/>
-          <p:cNvCxnSpPr>
-            <a:stCxn id="216" idx="3"/>
-            <a:endCxn id="612" idx="1"/>
-          </p:cNvCxnSpPr>
-          <p:nvPr/>
-        </p:nvCxnSpPr>
-        <p:spPr>
-          <a:xfrm flipV="1">
-            <a:off x="5616361" y="2845094"/>
-            <a:ext cx="1982055" cy="493787"/>
-          </a:xfrm>
-          <a:prstGeom prst="bentConnector3">
-            <a:avLst>
-              <a:gd name="adj1" fmla="val 50000"/>
-            </a:avLst>
-          </a:prstGeom>
-          <a:ln w="9525">
-            <a:solidFill>
-              <a:schemeClr val="accent4">
-                <a:lumMod val="75000"/>
-              </a:schemeClr>
-            </a:solidFill>
-            <a:prstDash val="dash"/>
-            <a:headEnd type="arrow"/>
-            <a:tailEnd type="arrow"/>
-          </a:ln>
-        </p:spPr>
-        <p:style>
-          <a:lnRef idx="1">
-            <a:schemeClr val="accent1"/>
-          </a:lnRef>
-          <a:fillRef idx="0">
-            <a:schemeClr val="accent1"/>
-          </a:fillRef>
-          <a:effectRef idx="0">
-            <a:schemeClr val="accent1"/>
-          </a:effectRef>
-          <a:fontRef idx="minor">
-            <a:schemeClr val="tx1"/>
-          </a:fontRef>
-        </p:style>
-      </p:cxnSp>
-      <p:sp>
-        <p:nvSpPr>
-          <p:cNvPr id="216" name="Rounded Rectangle 215"/>
-          <p:cNvSpPr/>
-          <p:nvPr/>
-        </p:nvSpPr>
-        <p:spPr>
-          <a:xfrm>
-            <a:off x="4044381" y="2655675"/>
-            <a:ext cx="1571980" cy="1366412"/>
-          </a:xfrm>
-          <a:prstGeom prst="roundRect">
-            <a:avLst>
-              <a:gd name="adj" fmla="val 7153"/>
-            </a:avLst>
-          </a:prstGeom>
-          <a:solidFill>
-            <a:schemeClr val="accent6">
-              <a:lumMod val="20000"/>
-              <a:lumOff val="80000"/>
-              <a:alpha val="51000"/>
-            </a:schemeClr>
-          </a:solidFill>
-          <a:ln w="34925">
-            <a:solidFill>
-              <a:schemeClr val="accent3">
-                <a:lumMod val="75000"/>
-              </a:schemeClr>
-            </a:solidFill>
-          </a:ln>
-          <a:effectLst/>
-        </p:spPr>
-        <p:style>
-          <a:lnRef idx="1">
-            <a:schemeClr val="accent1"/>
-          </a:lnRef>
-          <a:fillRef idx="3">
-            <a:schemeClr val="accent1"/>
-          </a:fillRef>
-          <a:effectRef idx="2">
-            <a:schemeClr val="accent1"/>
-          </a:effectRef>
-          <a:fontRef idx="minor">
-            <a:schemeClr val="lt1"/>
-          </a:fontRef>
-        </p:style>
-        <p:txBody>
-          <a:bodyPr rtlCol="0" anchor="t" anchorCtr="0"/>
-          <a:lstStyle/>
-          <a:p>
-            <a:pPr algn="ctr"/>
-            <a:endParaRPr lang="en-US" sz="2400" b="1" i="1" dirty="0">
-              <a:solidFill>
-                <a:schemeClr val="accent1">
-                  <a:lumMod val="50000"/>
-                </a:schemeClr>
-              </a:solidFill>
-            </a:endParaRPr>
-          </a:p>
-        </p:txBody>
-      </p:sp>
-      <p:cxnSp>
-        <p:nvCxnSpPr>
-          <p:cNvPr id="281" name="Elbow Connector 280"/>
-          <p:cNvCxnSpPr>
-            <a:stCxn id="187" idx="3"/>
-            <a:endCxn id="216" idx="1"/>
-          </p:cNvCxnSpPr>
-          <p:nvPr/>
-        </p:nvCxnSpPr>
-        <p:spPr>
-          <a:xfrm>
-            <a:off x="3634305" y="2135293"/>
-            <a:ext cx="410076" cy="1203588"/>
-          </a:xfrm>
-          <a:prstGeom prst="bentConnector3">
-            <a:avLst>
-              <a:gd name="adj1" fmla="val 50000"/>
-            </a:avLst>
-          </a:prstGeom>
-          <a:ln w="9525">
-            <a:solidFill>
-              <a:schemeClr val="accent5">
-                <a:lumMod val="50000"/>
-              </a:schemeClr>
-            </a:solidFill>
-            <a:prstDash val="sysDot"/>
-            <a:headEnd type="none"/>
-            <a:tailEnd type="arrow"/>
-          </a:ln>
-        </p:spPr>
-        <p:style>
-          <a:lnRef idx="1">
-            <a:schemeClr val="accent1"/>
-          </a:lnRef>
-          <a:fillRef idx="0">
-            <a:schemeClr val="accent1"/>
-          </a:fillRef>
-          <a:effectRef idx="0">
-            <a:schemeClr val="accent1"/>
-          </a:effectRef>
-          <a:fontRef idx="minor">
-            <a:schemeClr val="tx1"/>
-          </a:fontRef>
-        </p:style>
-      </p:cxnSp>
-      <p:cxnSp>
-        <p:nvCxnSpPr>
-          <p:cNvPr id="282" name="Elbow Connector 281"/>
-          <p:cNvCxnSpPr>
-            <a:stCxn id="185" idx="3"/>
-            <a:endCxn id="216" idx="1"/>
-          </p:cNvCxnSpPr>
-          <p:nvPr/>
-        </p:nvCxnSpPr>
-        <p:spPr>
-          <a:xfrm>
-            <a:off x="3338734" y="2880361"/>
-            <a:ext cx="705647" cy="458520"/>
-          </a:xfrm>
-          <a:prstGeom prst="bentConnector3">
-            <a:avLst>
-              <a:gd name="adj1" fmla="val 50000"/>
-            </a:avLst>
-          </a:prstGeom>
-          <a:ln w="9525">
-            <a:solidFill>
-              <a:schemeClr val="accent5">
-                <a:lumMod val="50000"/>
-              </a:schemeClr>
-            </a:solidFill>
-            <a:prstDash val="sysDot"/>
-            <a:headEnd type="none"/>
-            <a:tailEnd type="arrow"/>
-          </a:ln>
-        </p:spPr>
-        <p:style>
-          <a:lnRef idx="1">
-            <a:schemeClr val="accent1"/>
-          </a:lnRef>
-          <a:fillRef idx="0">
-            <a:schemeClr val="accent1"/>
-          </a:fillRef>
-          <a:effectRef idx="0">
-            <a:schemeClr val="accent1"/>
-          </a:effectRef>
-          <a:fontRef idx="minor">
-            <a:schemeClr val="tx1"/>
-          </a:fontRef>
-        </p:style>
-      </p:cxnSp>
-      <p:cxnSp>
-        <p:nvCxnSpPr>
-          <p:cNvPr id="283" name="Elbow Connector 282"/>
-          <p:cNvCxnSpPr>
-            <a:stCxn id="198" idx="3"/>
-            <a:endCxn id="216" idx="1"/>
-          </p:cNvCxnSpPr>
-          <p:nvPr/>
-        </p:nvCxnSpPr>
-        <p:spPr>
-          <a:xfrm flipV="1">
-            <a:off x="3338734" y="3338881"/>
-            <a:ext cx="705647" cy="303480"/>
-          </a:xfrm>
-          <a:prstGeom prst="bentConnector3">
-            <a:avLst>
-              <a:gd name="adj1" fmla="val 50000"/>
-            </a:avLst>
-          </a:prstGeom>
-          <a:ln w="9525">
-            <a:solidFill>
-              <a:schemeClr val="accent5">
-                <a:lumMod val="50000"/>
-              </a:schemeClr>
-            </a:solidFill>
-            <a:prstDash val="sysDot"/>
-            <a:headEnd type="none"/>
-            <a:tailEnd type="arrow"/>
-          </a:ln>
-        </p:spPr>
-        <p:style>
-          <a:lnRef idx="1">
-            <a:schemeClr val="accent1"/>
-          </a:lnRef>
-          <a:fillRef idx="0">
-            <a:schemeClr val="accent1"/>
-          </a:fillRef>
-          <a:effectRef idx="0">
-            <a:schemeClr val="accent1"/>
-          </a:effectRef>
-          <a:fontRef idx="minor">
-            <a:schemeClr val="tx1"/>
-          </a:fontRef>
-        </p:style>
-      </p:cxnSp>
-      <p:cxnSp>
-        <p:nvCxnSpPr>
-          <p:cNvPr id="284" name="Elbow Connector 283"/>
-          <p:cNvCxnSpPr>
-            <a:stCxn id="287" idx="3"/>
-            <a:endCxn id="216" idx="1"/>
-          </p:cNvCxnSpPr>
-          <p:nvPr/>
-        </p:nvCxnSpPr>
-        <p:spPr>
-          <a:xfrm flipV="1">
-            <a:off x="3634305" y="3338881"/>
-            <a:ext cx="410076" cy="1043329"/>
-          </a:xfrm>
-          <a:prstGeom prst="bentConnector3">
-            <a:avLst>
-              <a:gd name="adj1" fmla="val 50000"/>
-            </a:avLst>
-          </a:prstGeom>
-          <a:ln w="9525">
-            <a:solidFill>
-              <a:schemeClr val="accent5">
-                <a:lumMod val="50000"/>
-              </a:schemeClr>
-            </a:solidFill>
-            <a:prstDash val="sysDot"/>
-            <a:headEnd type="none"/>
-            <a:tailEnd type="arrow"/>
-          </a:ln>
-        </p:spPr>
-        <p:style>
-          <a:lnRef idx="1">
-            <a:schemeClr val="accent1"/>
-          </a:lnRef>
-          <a:fillRef idx="0">
-            <a:schemeClr val="accent1"/>
-          </a:fillRef>
-          <a:effectRef idx="0">
-            <a:schemeClr val="accent1"/>
-          </a:effectRef>
-          <a:fontRef idx="minor">
-            <a:schemeClr val="tx1"/>
-          </a:fontRef>
-        </p:style>
-      </p:cxnSp>
-      <p:grpSp>
-        <p:nvGrpSpPr>
-          <p:cNvPr id="370" name="Group 369"/>
-          <p:cNvGrpSpPr/>
-          <p:nvPr/>
-        </p:nvGrpSpPr>
-        <p:grpSpPr>
-          <a:xfrm>
-            <a:off x="1897634" y="3322320"/>
-            <a:ext cx="1441100" cy="640080"/>
-            <a:chOff x="1541872" y="3523622"/>
-            <a:chExt cx="1441100" cy="640080"/>
-          </a:xfrm>
-        </p:grpSpPr>
-        <p:pic>
-          <p:nvPicPr>
-            <p:cNvPr id="193" name="image.png" descr="image.png"/>
-            <p:cNvPicPr>
-              <a:picLocks noChangeAspect="1"/>
-            </p:cNvPicPr>
-            <p:nvPr/>
-          </p:nvPicPr>
-          <p:blipFill>
-            <a:blip r:embed="rId8">
-              <a:extLst/>
-            </a:blip>
-            <a:srcRect/>
-            <a:stretch>
-              <a:fillRect/>
-            </a:stretch>
-          </p:blipFill>
-          <p:spPr>
-            <a:xfrm rot="5400000">
-              <a:off x="2211674" y="3713488"/>
-              <a:ext cx="354780" cy="260348"/>
-            </a:xfrm>
-            <a:prstGeom prst="rect">
-              <a:avLst/>
-            </a:prstGeom>
-            <a:solidFill>
-              <a:schemeClr val="bg1"/>
-            </a:solidFill>
-            <a:ln w="12700" cap="flat">
-              <a:noFill/>
-              <a:miter lim="400000"/>
-            </a:ln>
-            <a:effectLst/>
-          </p:spPr>
-        </p:pic>
-        <p:pic>
-          <p:nvPicPr>
-            <p:cNvPr id="198" name="pasted-image.pdf" descr="pasted-image.pdf"/>
-            <p:cNvPicPr>
-              <a:picLocks noChangeAspect="1"/>
-            </p:cNvPicPr>
-            <p:nvPr/>
-          </p:nvPicPr>
-          <p:blipFill>
-            <a:blip r:embed="rId9">
-              <a:alphaModFix amt="63000"/>
-              <a:extLst>
-                <a:ext uri="{BEBA8EAE-BF5A-486C-A8C5-ECC9F3942E4B}">
-                  <a14:imgProps xmlns:a14="http://schemas.microsoft.com/office/drawing/2010/main">
-                    <a14:imgLayer r:embed="rId10">
-                      <a14:imgEffect>
-                        <a14:colorTemperature colorTemp="6944"/>
-                      </a14:imgEffect>
-                      <a14:imgEffect>
-                        <a14:saturation sat="400000"/>
-                      </a14:imgEffect>
-                    </a14:imgLayer>
-                  </a14:imgProps>
-                </a:ext>
-              </a:extLst>
-            </a:blip>
-            <a:stretch>
-              <a:fillRect/>
-            </a:stretch>
-          </p:blipFill>
-          <p:spPr>
-            <a:xfrm>
-              <a:off x="2593988" y="3613448"/>
-              <a:ext cx="388984" cy="460429"/>
-            </a:xfrm>
-            <a:prstGeom prst="rect">
-              <a:avLst/>
-            </a:prstGeom>
-            <a:solidFill>
-              <a:schemeClr val="bg1"/>
-            </a:solidFill>
-            <a:ln w="12700" cap="flat">
-              <a:noFill/>
-              <a:miter lim="400000"/>
-            </a:ln>
-            <a:effectLst/>
-          </p:spPr>
-        </p:pic>
-        <p:pic>
-          <p:nvPicPr>
-            <p:cNvPr id="132" name="Picture 131"/>
-            <p:cNvPicPr>
-              <a:picLocks noChangeAspect="1"/>
-            </p:cNvPicPr>
-            <p:nvPr/>
-          </p:nvPicPr>
-          <p:blipFill>
-            <a:blip r:embed="rId11">
-              <a:extLst>
-                <a:ext uri="{28A0092B-C50C-407E-A947-70E740481C1C}">
-                  <a14:useLocalDpi xmlns:a14="http://schemas.microsoft.com/office/drawing/2010/main" val="0"/>
-                </a:ext>
-              </a:extLst>
-            </a:blip>
-            <a:stretch>
-              <a:fillRect/>
-            </a:stretch>
-          </p:blipFill>
-          <p:spPr>
-            <a:xfrm>
-              <a:off x="1541872" y="3523622"/>
-              <a:ext cx="669509" cy="640080"/>
-            </a:xfrm>
-            <a:prstGeom prst="rect">
-              <a:avLst/>
-            </a:prstGeom>
-          </p:spPr>
-        </p:pic>
-      </p:grpSp>
-      <p:pic>
-        <p:nvPicPr>
-          <p:cNvPr id="136" name="Picture 135"/>
-          <p:cNvPicPr>
-            <a:picLocks noChangeAspect="1"/>
-          </p:cNvPicPr>
-          <p:nvPr/>
-        </p:nvPicPr>
-        <p:blipFill>
-          <a:blip r:embed="rId12">
-            <a:extLst>
-              <a:ext uri="{28A0092B-C50C-407E-A947-70E740481C1C}">
-                <a14:useLocalDpi xmlns:a14="http://schemas.microsoft.com/office/drawing/2010/main" val="0"/>
-              </a:ext>
-            </a:extLst>
-          </a:blip>
-          <a:stretch>
-            <a:fillRect/>
-          </a:stretch>
-        </p:blipFill>
-        <p:spPr>
-          <a:xfrm>
-            <a:off x="4141643" y="2848996"/>
-            <a:ext cx="1363787" cy="967648"/>
-          </a:xfrm>
-          <a:prstGeom prst="rect">
-            <a:avLst/>
-          </a:prstGeom>
-        </p:spPr>
-      </p:pic>
-      <p:grpSp>
-        <p:nvGrpSpPr>
-          <p:cNvPr id="360" name="Group 359"/>
-          <p:cNvGrpSpPr/>
-          <p:nvPr/>
-        </p:nvGrpSpPr>
-        <p:grpSpPr>
-          <a:xfrm>
-            <a:off x="1896199" y="2527676"/>
-            <a:ext cx="1442535" cy="640080"/>
-            <a:chOff x="1536595" y="2828796"/>
-            <a:chExt cx="1442535" cy="640080"/>
-          </a:xfrm>
-        </p:grpSpPr>
-        <p:pic>
-          <p:nvPicPr>
-            <p:cNvPr id="185" name="pasted-image.pdf" descr="pasted-image.pdf"/>
-            <p:cNvPicPr>
-              <a:picLocks noChangeAspect="1"/>
-            </p:cNvPicPr>
-            <p:nvPr/>
-          </p:nvPicPr>
-          <p:blipFill>
-            <a:blip r:embed="rId9">
-              <a:alphaModFix amt="63000"/>
-              <a:extLst>
-                <a:ext uri="{BEBA8EAE-BF5A-486C-A8C5-ECC9F3942E4B}">
-                  <a14:imgProps xmlns:a14="http://schemas.microsoft.com/office/drawing/2010/main">
-                    <a14:imgLayer r:embed="rId10">
-                      <a14:imgEffect>
-                        <a14:colorTemperature colorTemp="6944"/>
-                      </a14:imgEffect>
-                      <a14:imgEffect>
-                        <a14:saturation sat="400000"/>
-                      </a14:imgEffect>
-                    </a14:imgLayer>
-                  </a14:imgProps>
-                </a:ext>
-              </a:extLst>
-            </a:blip>
-            <a:stretch>
-              <a:fillRect/>
-            </a:stretch>
-          </p:blipFill>
-          <p:spPr>
-            <a:xfrm>
-              <a:off x="2590146" y="2951266"/>
-              <a:ext cx="388984" cy="460429"/>
-            </a:xfrm>
-            <a:prstGeom prst="rect">
-              <a:avLst/>
-            </a:prstGeom>
-            <a:solidFill>
-              <a:schemeClr val="bg1"/>
-            </a:solidFill>
-            <a:ln w="12700" cap="flat">
-              <a:noFill/>
-              <a:miter lim="400000"/>
-            </a:ln>
-            <a:effectLst/>
-          </p:spPr>
-        </p:pic>
-        <p:pic>
-          <p:nvPicPr>
-            <p:cNvPr id="188" name="image.png" descr="image.png"/>
-            <p:cNvPicPr>
-              <a:picLocks noChangeAspect="1"/>
-            </p:cNvPicPr>
-            <p:nvPr/>
-          </p:nvPicPr>
-          <p:blipFill>
-            <a:blip r:embed="rId8">
-              <a:extLst/>
-            </a:blip>
-            <a:srcRect/>
-            <a:stretch>
-              <a:fillRect/>
-            </a:stretch>
-          </p:blipFill>
-          <p:spPr>
-            <a:xfrm rot="5400000">
-              <a:off x="2211674" y="3051306"/>
-              <a:ext cx="354780" cy="260348"/>
-            </a:xfrm>
-            <a:prstGeom prst="rect">
-              <a:avLst/>
-            </a:prstGeom>
-            <a:solidFill>
-              <a:schemeClr val="bg1"/>
-            </a:solidFill>
-            <a:ln w="12700" cap="flat">
-              <a:noFill/>
-              <a:miter lim="400000"/>
-            </a:ln>
-            <a:effectLst/>
-          </p:spPr>
-        </p:pic>
-        <p:pic>
-          <p:nvPicPr>
-            <p:cNvPr id="137" name="Picture 136"/>
-            <p:cNvPicPr>
-              <a:picLocks noChangeAspect="1"/>
-            </p:cNvPicPr>
-            <p:nvPr/>
-          </p:nvPicPr>
-          <p:blipFill>
-            <a:blip r:embed="rId13">
-              <a:extLst>
-                <a:ext uri="{28A0092B-C50C-407E-A947-70E740481C1C}">
-                  <a14:useLocalDpi xmlns:a14="http://schemas.microsoft.com/office/drawing/2010/main" val="0"/>
-                </a:ext>
-              </a:extLst>
-            </a:blip>
-            <a:stretch>
-              <a:fillRect/>
-            </a:stretch>
-          </p:blipFill>
-          <p:spPr>
-            <a:xfrm>
-              <a:off x="1536595" y="2828796"/>
-              <a:ext cx="669509" cy="640080"/>
-            </a:xfrm>
-            <a:prstGeom prst="rect">
-              <a:avLst/>
-            </a:prstGeom>
-          </p:spPr>
-        </p:pic>
-      </p:grpSp>
-      <p:grpSp>
-        <p:nvGrpSpPr>
-          <p:cNvPr id="371" name="Group 370"/>
-          <p:cNvGrpSpPr/>
-          <p:nvPr/>
-        </p:nvGrpSpPr>
-        <p:grpSpPr>
-          <a:xfrm>
-            <a:off x="2175774" y="4068598"/>
-            <a:ext cx="1458531" cy="640080"/>
-            <a:chOff x="1524441" y="4206164"/>
-            <a:chExt cx="1458531" cy="640080"/>
-          </a:xfrm>
-        </p:grpSpPr>
-        <p:pic>
-          <p:nvPicPr>
-            <p:cNvPr id="287" name="pasted-image.pdf" descr="pasted-image.pdf"/>
-            <p:cNvPicPr>
-              <a:picLocks noChangeAspect="1"/>
-            </p:cNvPicPr>
-            <p:nvPr/>
-          </p:nvPicPr>
-          <p:blipFill>
-            <a:blip r:embed="rId9">
-              <a:alphaModFix amt="63000"/>
-              <a:extLst>
-                <a:ext uri="{BEBA8EAE-BF5A-486C-A8C5-ECC9F3942E4B}">
-                  <a14:imgProps xmlns:a14="http://schemas.microsoft.com/office/drawing/2010/main">
-                    <a14:imgLayer r:embed="rId10">
-                      <a14:imgEffect>
-                        <a14:colorTemperature colorTemp="6944"/>
-                      </a14:imgEffect>
-                      <a14:imgEffect>
-                        <a14:saturation sat="400000"/>
-                      </a14:imgEffect>
-                    </a14:imgLayer>
-                  </a14:imgProps>
-                </a:ext>
-              </a:extLst>
-            </a:blip>
-            <a:stretch>
-              <a:fillRect/>
-            </a:stretch>
-          </p:blipFill>
-          <p:spPr>
-            <a:xfrm>
-              <a:off x="2593988" y="4289561"/>
-              <a:ext cx="388984" cy="460429"/>
-            </a:xfrm>
-            <a:prstGeom prst="rect">
-              <a:avLst/>
-            </a:prstGeom>
-            <a:solidFill>
-              <a:schemeClr val="bg1"/>
-            </a:solidFill>
-            <a:ln w="12700" cap="flat">
-              <a:noFill/>
-              <a:miter lim="400000"/>
-            </a:ln>
-            <a:effectLst/>
-          </p:spPr>
-        </p:pic>
-        <p:pic>
-          <p:nvPicPr>
-            <p:cNvPr id="162" name="image.png" descr="image.png"/>
-            <p:cNvPicPr>
-              <a:picLocks noChangeAspect="1"/>
-            </p:cNvPicPr>
-            <p:nvPr/>
-          </p:nvPicPr>
-          <p:blipFill>
-            <a:blip r:embed="rId8">
-              <a:extLst/>
-            </a:blip>
-            <a:srcRect/>
-            <a:stretch>
-              <a:fillRect/>
-            </a:stretch>
-          </p:blipFill>
-          <p:spPr>
-            <a:xfrm rot="5400000">
-              <a:off x="2206041" y="4389601"/>
-              <a:ext cx="354780" cy="260348"/>
-            </a:xfrm>
-            <a:prstGeom prst="rect">
-              <a:avLst/>
-            </a:prstGeom>
-            <a:solidFill>
-              <a:schemeClr val="bg1"/>
-            </a:solidFill>
-            <a:ln w="12700" cap="flat">
-              <a:noFill/>
-              <a:miter lim="400000"/>
-            </a:ln>
-            <a:effectLst/>
-          </p:spPr>
-        </p:pic>
-        <p:pic>
-          <p:nvPicPr>
-            <p:cNvPr id="138" name="Picture 137"/>
-            <p:cNvPicPr>
-              <a:picLocks noChangeAspect="1"/>
-            </p:cNvPicPr>
-            <p:nvPr/>
-          </p:nvPicPr>
-          <p:blipFill>
-            <a:blip r:embed="rId14">
-              <a:extLst>
-                <a:ext uri="{28A0092B-C50C-407E-A947-70E740481C1C}">
-                  <a14:useLocalDpi xmlns:a14="http://schemas.microsoft.com/office/drawing/2010/main" val="0"/>
-                </a:ext>
-              </a:extLst>
-            </a:blip>
-            <a:stretch>
-              <a:fillRect/>
-            </a:stretch>
-          </p:blipFill>
-          <p:spPr>
-            <a:xfrm>
-              <a:off x="1524441" y="4206164"/>
-              <a:ext cx="669509" cy="640080"/>
-            </a:xfrm>
-            <a:prstGeom prst="rect">
-              <a:avLst/>
-            </a:prstGeom>
-          </p:spPr>
-        </p:pic>
-      </p:grpSp>
-      <p:grpSp>
-        <p:nvGrpSpPr>
-          <p:cNvPr id="441" name="Group 440"/>
-          <p:cNvGrpSpPr/>
-          <p:nvPr/>
-        </p:nvGrpSpPr>
-        <p:grpSpPr>
-          <a:xfrm>
-            <a:off x="2197063" y="1815252"/>
-            <a:ext cx="1437242" cy="640080"/>
-            <a:chOff x="1968249" y="2261608"/>
-            <a:chExt cx="1437242" cy="640080"/>
-          </a:xfrm>
-        </p:grpSpPr>
-        <p:pic>
-          <p:nvPicPr>
-            <p:cNvPr id="187" name="pasted-image.pdf" descr="pasted-image.pdf"/>
-            <p:cNvPicPr>
-              <a:picLocks noChangeAspect="1"/>
-            </p:cNvPicPr>
-            <p:nvPr/>
-          </p:nvPicPr>
-          <p:blipFill>
-            <a:blip r:embed="rId9">
-              <a:alphaModFix amt="63000"/>
-              <a:extLst>
-                <a:ext uri="{BEBA8EAE-BF5A-486C-A8C5-ECC9F3942E4B}">
-                  <a14:imgProps xmlns:a14="http://schemas.microsoft.com/office/drawing/2010/main">
-                    <a14:imgLayer r:embed="rId10">
-                      <a14:imgEffect>
-                        <a14:colorTemperature colorTemp="6944"/>
-                      </a14:imgEffect>
-                      <a14:imgEffect>
-                        <a14:saturation sat="400000"/>
-                      </a14:imgEffect>
-                    </a14:imgLayer>
-                  </a14:imgProps>
-                </a:ext>
-              </a:extLst>
-            </a:blip>
-            <a:stretch>
-              <a:fillRect/>
-            </a:stretch>
-          </p:blipFill>
-          <p:spPr>
-            <a:xfrm>
-              <a:off x="3016507" y="2351434"/>
-              <a:ext cx="388984" cy="460429"/>
-            </a:xfrm>
-            <a:prstGeom prst="rect">
-              <a:avLst/>
-            </a:prstGeom>
-            <a:solidFill>
-              <a:schemeClr val="bg1"/>
-            </a:solidFill>
-            <a:ln w="12700" cap="flat">
-              <a:noFill/>
-              <a:miter lim="400000"/>
-            </a:ln>
-            <a:effectLst/>
-          </p:spPr>
-        </p:pic>
-        <p:pic>
-          <p:nvPicPr>
-            <p:cNvPr id="192" name="image.png" descr="image.png"/>
-            <p:cNvPicPr>
-              <a:picLocks noChangeAspect="1"/>
-            </p:cNvPicPr>
-            <p:nvPr/>
-          </p:nvPicPr>
-          <p:blipFill>
-            <a:blip r:embed="rId8">
-              <a:extLst/>
-            </a:blip>
-            <a:srcRect/>
-            <a:stretch>
-              <a:fillRect/>
-            </a:stretch>
-          </p:blipFill>
-          <p:spPr>
-            <a:xfrm rot="5400000">
-              <a:off x="2638003" y="2451474"/>
-              <a:ext cx="354780" cy="260348"/>
-            </a:xfrm>
-            <a:prstGeom prst="rect">
-              <a:avLst/>
-            </a:prstGeom>
-            <a:solidFill>
-              <a:schemeClr val="bg1"/>
-            </a:solidFill>
-            <a:ln w="12700" cap="flat">
-              <a:noFill/>
-              <a:miter lim="400000"/>
-            </a:ln>
-            <a:effectLst/>
-          </p:spPr>
-        </p:pic>
-        <p:pic>
-          <p:nvPicPr>
-            <p:cNvPr id="440" name="Picture 439"/>
-            <p:cNvPicPr>
-              <a:picLocks noChangeAspect="1"/>
-            </p:cNvPicPr>
-            <p:nvPr/>
-          </p:nvPicPr>
-          <p:blipFill>
-            <a:blip r:embed="rId15">
-              <a:extLst>
-                <a:ext uri="{28A0092B-C50C-407E-A947-70E740481C1C}">
-                  <a14:useLocalDpi xmlns:a14="http://schemas.microsoft.com/office/drawing/2010/main" val="0"/>
-                </a:ext>
-              </a:extLst>
-            </a:blip>
-            <a:stretch>
-              <a:fillRect/>
-            </a:stretch>
-          </p:blipFill>
-          <p:spPr>
-            <a:xfrm>
-              <a:off x="1968249" y="2261608"/>
-              <a:ext cx="670936" cy="640080"/>
-            </a:xfrm>
-            <a:prstGeom prst="rect">
-              <a:avLst/>
-            </a:prstGeom>
-          </p:spPr>
-        </p:pic>
-      </p:grpSp>
-      <p:cxnSp>
-        <p:nvCxnSpPr>
-          <p:cNvPr id="575" name="Elbow Connector 574"/>
-          <p:cNvCxnSpPr>
-            <a:stCxn id="216" idx="3"/>
-            <a:endCxn id="567" idx="1"/>
-          </p:cNvCxnSpPr>
-          <p:nvPr/>
-        </p:nvCxnSpPr>
-        <p:spPr>
-          <a:xfrm flipV="1">
-            <a:off x="5616361" y="3128505"/>
-            <a:ext cx="466862" cy="210376"/>
-          </a:xfrm>
-          <a:prstGeom prst="bentConnector3">
-            <a:avLst>
-              <a:gd name="adj1" fmla="val 50000"/>
-            </a:avLst>
-          </a:prstGeom>
-          <a:ln w="9525">
-            <a:solidFill>
-              <a:schemeClr val="accent4">
-                <a:lumMod val="75000"/>
-              </a:schemeClr>
-            </a:solidFill>
-            <a:prstDash val="dash"/>
-            <a:headEnd type="arrow"/>
-            <a:tailEnd type="arrow"/>
-          </a:ln>
-        </p:spPr>
-        <p:style>
-          <a:lnRef idx="1">
-            <a:schemeClr val="accent1"/>
-          </a:lnRef>
-          <a:fillRef idx="0">
-            <a:schemeClr val="accent1"/>
-          </a:fillRef>
-          <a:effectRef idx="0">
-            <a:schemeClr val="accent1"/>
-          </a:effectRef>
-          <a:fontRef idx="minor">
-            <a:schemeClr val="tx1"/>
-          </a:fontRef>
-        </p:style>
-      </p:cxnSp>
-      <p:pic>
-        <p:nvPicPr>
-          <p:cNvPr id="614" name="Picture 613"/>
-          <p:cNvPicPr>
-            <a:picLocks noChangeAspect="1"/>
-          </p:cNvPicPr>
-          <p:nvPr/>
-        </p:nvPicPr>
-        <p:blipFill>
-          <a:blip r:embed="rId16">
-            <a:extLst>
-              <a:ext uri="{28A0092B-C50C-407E-A947-70E740481C1C}">
-                <a14:useLocalDpi xmlns:a14="http://schemas.microsoft.com/office/drawing/2010/main" val="0"/>
-              </a:ext>
-            </a:extLst>
-          </a:blip>
-          <a:stretch>
-            <a:fillRect/>
-          </a:stretch>
-        </p:blipFill>
-        <p:spPr>
-          <a:xfrm>
-            <a:off x="6300568" y="1819078"/>
-            <a:ext cx="482678" cy="296448"/>
-          </a:xfrm>
-          <a:prstGeom prst="rect">
-            <a:avLst/>
-          </a:prstGeom>
-          <a:effectLst>
-            <a:outerShdw blurRad="12700" dist="12700" dir="2700000" algn="tl" rotWithShape="0">
-              <a:schemeClr val="bg1">
-                <a:alpha val="40000"/>
-              </a:schemeClr>
-            </a:outerShdw>
-          </a:effectLst>
-        </p:spPr>
-      </p:pic>
-      <p:cxnSp>
-        <p:nvCxnSpPr>
-          <p:cNvPr id="280" name="Elbow Connector 279"/>
-          <p:cNvCxnSpPr>
-            <a:stCxn id="216" idx="3"/>
-          </p:cNvCxnSpPr>
-          <p:nvPr/>
-        </p:nvCxnSpPr>
-        <p:spPr>
-          <a:xfrm>
-            <a:off x="5616361" y="3338881"/>
-            <a:ext cx="1349277" cy="890942"/>
-          </a:xfrm>
-          <a:prstGeom prst="bentConnector3">
-            <a:avLst>
-              <a:gd name="adj1" fmla="val 27781"/>
-            </a:avLst>
-          </a:prstGeom>
-          <a:ln w="9525">
-            <a:solidFill>
-              <a:schemeClr val="accent4">
-                <a:lumMod val="75000"/>
-              </a:schemeClr>
-            </a:solidFill>
-            <a:prstDash val="dash"/>
-            <a:headEnd type="arrow"/>
-            <a:tailEnd type="arrow"/>
-          </a:ln>
-        </p:spPr>
-        <p:style>
-          <a:lnRef idx="1">
-            <a:schemeClr val="accent1"/>
-          </a:lnRef>
-          <a:fillRef idx="0">
-            <a:schemeClr val="accent1"/>
-          </a:fillRef>
-          <a:effectRef idx="0">
-            <a:schemeClr val="accent1"/>
-          </a:effectRef>
-          <a:fontRef idx="minor">
-            <a:schemeClr val="tx1"/>
-          </a:fontRef>
-        </p:style>
-      </p:cxnSp>
-      <p:grpSp>
-        <p:nvGrpSpPr>
-          <p:cNvPr id="582" name="Group 581"/>
-          <p:cNvGrpSpPr/>
-          <p:nvPr/>
-        </p:nvGrpSpPr>
-        <p:grpSpPr>
-          <a:xfrm>
-            <a:off x="6083223" y="2188411"/>
-            <a:ext cx="1943934" cy="1880187"/>
-            <a:chOff x="6092546" y="2173024"/>
-            <a:chExt cx="1943934" cy="1880187"/>
-          </a:xfrm>
-        </p:grpSpPr>
-        <p:sp>
-          <p:nvSpPr>
-            <p:cNvPr id="567" name="Rectangle 566"/>
-            <p:cNvSpPr/>
-            <p:nvPr/>
-          </p:nvSpPr>
-          <p:spPr>
-            <a:xfrm>
-              <a:off x="6092546" y="2173024"/>
-              <a:ext cx="1943934" cy="1880187"/>
-            </a:xfrm>
-            <a:prstGeom prst="rect">
-              <a:avLst/>
-            </a:prstGeom>
-            <a:solidFill>
-              <a:srgbClr val="E6F4F5">
-                <a:alpha val="65000"/>
-              </a:srgbClr>
-            </a:solidFill>
-            <a:ln>
-              <a:solidFill>
-                <a:schemeClr val="bg1">
-                  <a:lumMod val="75000"/>
-                  <a:alpha val="40000"/>
-                </a:schemeClr>
-              </a:solidFill>
-              <a:prstDash val="dash"/>
-            </a:ln>
-          </p:spPr>
-          <p:style>
-            <a:lnRef idx="2">
-              <a:schemeClr val="accent1">
-                <a:shade val="50000"/>
-              </a:schemeClr>
-            </a:lnRef>
-            <a:fillRef idx="1">
-              <a:schemeClr val="accent1"/>
-            </a:fillRef>
-            <a:effectRef idx="0">
-              <a:schemeClr val="accent1"/>
-            </a:effectRef>
-            <a:fontRef idx="minor">
-              <a:schemeClr val="lt1"/>
-            </a:fontRef>
-          </p:style>
-          <p:txBody>
-            <a:bodyPr wrap="none" rtlCol="0" anchor="ctr"/>
-            <a:lstStyle/>
-            <a:p>
-              <a:pPr algn="ctr"/>
-              <a:endParaRPr lang="en-US" sz="1400" smtClean="0">
-                <a:solidFill>
-                  <a:schemeClr val="tx1">
-                    <a:lumMod val="85000"/>
-                    <a:lumOff val="15000"/>
-                  </a:schemeClr>
-                </a:solidFill>
-              </a:endParaRPr>
-            </a:p>
-          </p:txBody>
-        </p:sp>
-        <p:grpSp>
-          <p:nvGrpSpPr>
-            <p:cNvPr id="1049" name="Group 1048"/>
-            <p:cNvGrpSpPr/>
-            <p:nvPr/>
-          </p:nvGrpSpPr>
-          <p:grpSpPr>
-            <a:xfrm>
-              <a:off x="6191121" y="3168351"/>
-              <a:ext cx="962406" cy="824502"/>
-              <a:chOff x="8365690" y="2911597"/>
-              <a:chExt cx="962406" cy="824502"/>
-            </a:xfrm>
-            <a:effectLst>
-              <a:outerShdw blurRad="12700" dist="12700" dir="2700000" algn="tl" rotWithShape="0">
-                <a:prstClr val="black">
-                  <a:alpha val="40000"/>
-                </a:prstClr>
-              </a:outerShdw>
-            </a:effectLst>
-          </p:grpSpPr>
-          <p:grpSp>
-            <p:nvGrpSpPr>
-              <p:cNvPr id="420" name="Group 419"/>
-              <p:cNvGrpSpPr/>
-              <p:nvPr/>
-            </p:nvGrpSpPr>
-            <p:grpSpPr>
-              <a:xfrm>
-                <a:off x="8365690" y="2911597"/>
-                <a:ext cx="962406" cy="824502"/>
-                <a:chOff x="7953376" y="5039279"/>
-                <a:chExt cx="962406" cy="824502"/>
-              </a:xfrm>
-            </p:grpSpPr>
-            <p:sp>
-              <p:nvSpPr>
-                <p:cNvPr id="421" name="Hexagon 420"/>
-                <p:cNvSpPr/>
-                <p:nvPr/>
-              </p:nvSpPr>
-              <p:spPr>
-                <a:xfrm>
-                  <a:off x="7953376" y="5039279"/>
-                  <a:ext cx="962406" cy="824502"/>
-                </a:xfrm>
-                <a:prstGeom prst="hexagon">
-                  <a:avLst/>
-                </a:prstGeom>
-                <a:solidFill>
-                  <a:schemeClr val="accent6">
-                    <a:lumMod val="40000"/>
-                    <a:lumOff val="60000"/>
-                  </a:schemeClr>
-                </a:solidFill>
-                <a:ln>
-                  <a:noFill/>
-                </a:ln>
-              </p:spPr>
-              <p:style>
-                <a:lnRef idx="2">
-                  <a:schemeClr val="accent1">
-                    <a:shade val="50000"/>
-                  </a:schemeClr>
-                </a:lnRef>
-                <a:fillRef idx="1">
-                  <a:schemeClr val="accent1"/>
-                </a:fillRef>
-                <a:effectRef idx="0">
-                  <a:schemeClr val="accent1"/>
-                </a:effectRef>
-                <a:fontRef idx="minor">
-                  <a:schemeClr val="lt1"/>
-                </a:fontRef>
-              </p:style>
-              <p:txBody>
-                <a:bodyPr wrap="none" rtlCol="0" anchor="ctr"/>
-                <a:lstStyle/>
-                <a:p>
-                  <a:pPr algn="ctr"/>
-                  <a:endParaRPr lang="en-US" sz="1400" smtClean="0">
-                    <a:solidFill>
-                      <a:schemeClr val="tx1">
-                        <a:lumMod val="85000"/>
-                        <a:lumOff val="15000"/>
-                      </a:schemeClr>
-                    </a:solidFill>
-                  </a:endParaRPr>
-                </a:p>
-              </p:txBody>
-            </p:sp>
-            <p:grpSp>
-              <p:nvGrpSpPr>
-                <p:cNvPr id="422" name="Group 421"/>
-                <p:cNvGrpSpPr/>
-                <p:nvPr/>
-              </p:nvGrpSpPr>
-              <p:grpSpPr>
-                <a:xfrm>
-                  <a:off x="8097919" y="5098330"/>
-                  <a:ext cx="673321" cy="706400"/>
-                  <a:chOff x="6870571" y="4152548"/>
-                  <a:chExt cx="673321" cy="706400"/>
-                </a:xfrm>
-              </p:grpSpPr>
-              <p:pic>
-                <p:nvPicPr>
-                  <p:cNvPr id="423" name="pasted-image.pdf" descr="pasted-image.pdf"/>
-                  <p:cNvPicPr>
-                    <a:picLocks noChangeAspect="1"/>
-                  </p:cNvPicPr>
-                  <p:nvPr/>
-                </p:nvPicPr>
-                <p:blipFill>
-                  <a:blip r:embed="rId3">
-                    <a:extLst>
-                      <a:ext uri="{BEBA8EAE-BF5A-486C-A8C5-ECC9F3942E4B}">
-                        <a14:imgProps xmlns:a14="http://schemas.microsoft.com/office/drawing/2010/main">
-                          <a14:imgLayer r:embed="rId4">
-                            <a14:imgEffect>
-                              <a14:colorTemperature colorTemp="5093"/>
-                            </a14:imgEffect>
-                          </a14:imgLayer>
-                        </a14:imgProps>
-                      </a:ext>
-                    </a:extLst>
-                  </a:blip>
-                  <a:stretch>
-                    <a:fillRect/>
-                  </a:stretch>
-                </p:blipFill>
-                <p:spPr>
-                  <a:xfrm>
-                    <a:off x="7009377" y="4152548"/>
-                    <a:ext cx="534515" cy="549875"/>
-                  </a:xfrm>
-                  <a:prstGeom prst="rect">
-                    <a:avLst/>
-                  </a:prstGeom>
-                  <a:ln w="12700" cap="flat">
-                    <a:noFill/>
-                    <a:miter lim="400000"/>
-                  </a:ln>
-                  <a:effectLst>
-                    <a:outerShdw blurRad="25400" dist="25400" dir="2700000" algn="tl" rotWithShape="0">
-                      <a:prstClr val="black">
-                        <a:alpha val="40000"/>
-                      </a:prstClr>
-                    </a:outerShdw>
-                  </a:effectLst>
-                </p:spPr>
-              </p:pic>
-              <p:pic>
-                <p:nvPicPr>
-                  <p:cNvPr id="424" name="pasted-image.pdf" descr="pasted-image.pdf"/>
-                  <p:cNvPicPr>
-                    <a:picLocks noChangeAspect="1"/>
-                  </p:cNvPicPr>
-                  <p:nvPr/>
-                </p:nvPicPr>
-                <p:blipFill>
-                  <a:blip r:embed="rId3">
-                    <a:extLst>
-                      <a:ext uri="{BEBA8EAE-BF5A-486C-A8C5-ECC9F3942E4B}">
-                        <a14:imgProps xmlns:a14="http://schemas.microsoft.com/office/drawing/2010/main">
-                          <a14:imgLayer r:embed="rId4">
-                            <a14:imgEffect>
-                              <a14:colorTemperature colorTemp="5093"/>
-                            </a14:imgEffect>
-                          </a14:imgLayer>
-                        </a14:imgProps>
-                      </a:ext>
-                    </a:extLst>
-                  </a:blip>
-                  <a:stretch>
-                    <a:fillRect/>
-                  </a:stretch>
-                </p:blipFill>
-                <p:spPr>
-                  <a:xfrm>
-                    <a:off x="6949332" y="4228748"/>
-                    <a:ext cx="534515" cy="549875"/>
-                  </a:xfrm>
-                  <a:prstGeom prst="rect">
-                    <a:avLst/>
-                  </a:prstGeom>
-                  <a:ln w="12700" cap="flat">
-                    <a:noFill/>
-                    <a:miter lim="400000"/>
-                  </a:ln>
-                  <a:effectLst>
-                    <a:outerShdw blurRad="25400" dist="25400" dir="2700000" algn="tl" rotWithShape="0">
-                      <a:prstClr val="black">
-                        <a:alpha val="40000"/>
-                      </a:prstClr>
-                    </a:outerShdw>
-                  </a:effectLst>
-                </p:spPr>
-              </p:pic>
-              <p:pic>
-                <p:nvPicPr>
-                  <p:cNvPr id="425" name="pasted-image.pdf" descr="pasted-image.pdf"/>
-                  <p:cNvPicPr>
-                    <a:picLocks noChangeAspect="1"/>
-                  </p:cNvPicPr>
-                  <p:nvPr/>
-                </p:nvPicPr>
-                <p:blipFill>
-                  <a:blip r:embed="rId3">
-                    <a:extLst>
-                      <a:ext uri="{BEBA8EAE-BF5A-486C-A8C5-ECC9F3942E4B}">
-                        <a14:imgProps xmlns:a14="http://schemas.microsoft.com/office/drawing/2010/main">
-                          <a14:imgLayer r:embed="rId4">
-                            <a14:imgEffect>
-                              <a14:colorTemperature colorTemp="5093"/>
-                            </a14:imgEffect>
-                          </a14:imgLayer>
-                        </a14:imgProps>
-                      </a:ext>
-                    </a:extLst>
-                  </a:blip>
-                  <a:stretch>
-                    <a:fillRect/>
-                  </a:stretch>
-                </p:blipFill>
-                <p:spPr>
-                  <a:xfrm>
-                    <a:off x="6870571" y="4309073"/>
-                    <a:ext cx="534515" cy="549875"/>
-                  </a:xfrm>
-                  <a:prstGeom prst="rect">
-                    <a:avLst/>
-                  </a:prstGeom>
-                  <a:ln w="12700" cap="flat">
-                    <a:noFill/>
-                    <a:miter lim="400000"/>
-                  </a:ln>
-                  <a:effectLst>
-                    <a:outerShdw blurRad="25400" dist="25400" dir="2700000" algn="tl" rotWithShape="0">
-                      <a:prstClr val="black">
-                        <a:alpha val="40000"/>
-                      </a:prstClr>
-                    </a:outerShdw>
-                  </a:effectLst>
-                </p:spPr>
-              </p:pic>
-            </p:grpSp>
-          </p:grpSp>
-          <p:pic>
-            <p:nvPicPr>
-              <p:cNvPr id="426" name="Picture 425"/>
-              <p:cNvPicPr>
-                <a:picLocks noChangeAspect="1"/>
-              </p:cNvPicPr>
-              <p:nvPr/>
-            </p:nvPicPr>
-            <p:blipFill>
-              <a:blip r:embed="rId17">
-                <a:extLst>
-                  <a:ext uri="{28A0092B-C50C-407E-A947-70E740481C1C}">
-                    <a14:useLocalDpi xmlns:a14="http://schemas.microsoft.com/office/drawing/2010/main" val="0"/>
-                  </a:ext>
-                </a:extLst>
-              </a:blip>
-              <a:stretch>
-                <a:fillRect/>
-              </a:stretch>
-            </p:blipFill>
-            <p:spPr>
-              <a:xfrm rot="189821">
-                <a:off x="8612899" y="3244645"/>
-                <a:ext cx="324471" cy="324471"/>
-              </a:xfrm>
-              <a:prstGeom prst="rect">
-                <a:avLst/>
-              </a:prstGeom>
-            </p:spPr>
-          </p:pic>
-        </p:grpSp>
-        <p:grpSp>
-          <p:nvGrpSpPr>
-            <p:cNvPr id="1052" name="Group 1051"/>
-            <p:cNvGrpSpPr/>
-            <p:nvPr/>
-          </p:nvGrpSpPr>
-          <p:grpSpPr>
-            <a:xfrm>
-              <a:off x="6191121" y="2267649"/>
-              <a:ext cx="962406" cy="824502"/>
-              <a:chOff x="5029143" y="5373267"/>
-              <a:chExt cx="962406" cy="824502"/>
-            </a:xfrm>
-            <a:effectLst>
-              <a:outerShdw blurRad="12700" dist="12700" dir="2700000" algn="tl" rotWithShape="0">
-                <a:prstClr val="black">
-                  <a:alpha val="40000"/>
-                </a:prstClr>
-              </a:outerShdw>
-            </a:effectLst>
-          </p:grpSpPr>
-          <p:sp>
-            <p:nvSpPr>
-              <p:cNvPr id="437" name="Hexagon 436"/>
-              <p:cNvSpPr/>
-              <p:nvPr/>
-            </p:nvSpPr>
-            <p:spPr>
-              <a:xfrm>
-                <a:off x="5029143" y="5373267"/>
-                <a:ext cx="962406" cy="824502"/>
-              </a:xfrm>
-              <a:prstGeom prst="hexagon">
-                <a:avLst/>
-              </a:prstGeom>
-              <a:solidFill>
-                <a:schemeClr val="accent6">
-                  <a:lumMod val="40000"/>
-                  <a:lumOff val="60000"/>
-                </a:schemeClr>
-              </a:solidFill>
-              <a:ln>
-                <a:noFill/>
-              </a:ln>
-            </p:spPr>
-            <p:style>
-              <a:lnRef idx="2">
-                <a:schemeClr val="accent1">
-                  <a:shade val="50000"/>
-                </a:schemeClr>
-              </a:lnRef>
-              <a:fillRef idx="1">
-                <a:schemeClr val="accent1"/>
-              </a:fillRef>
-              <a:effectRef idx="0">
-                <a:schemeClr val="accent1"/>
-              </a:effectRef>
-              <a:fontRef idx="minor">
-                <a:schemeClr val="lt1"/>
-              </a:fontRef>
-            </p:style>
-            <p:txBody>
-              <a:bodyPr wrap="none" rtlCol="0" anchor="ctr"/>
-              <a:lstStyle/>
-              <a:p>
-                <a:pPr algn="ctr"/>
-                <a:endParaRPr lang="en-US" sz="1400" smtClean="0">
-                  <a:solidFill>
-                    <a:schemeClr val="tx1">
-                      <a:lumMod val="85000"/>
-                      <a:lumOff val="15000"/>
-                    </a:schemeClr>
-                  </a:solidFill>
-                </a:endParaRPr>
-              </a:p>
-            </p:txBody>
-          </p:sp>
-          <p:grpSp>
-            <p:nvGrpSpPr>
-              <p:cNvPr id="1043" name="Group 1042"/>
-              <p:cNvGrpSpPr/>
-              <p:nvPr/>
-            </p:nvGrpSpPr>
-            <p:grpSpPr>
-              <a:xfrm>
-                <a:off x="5173685" y="5432318"/>
-                <a:ext cx="673321" cy="706400"/>
-                <a:chOff x="6587851" y="4236330"/>
-                <a:chExt cx="673321" cy="706400"/>
-              </a:xfrm>
-            </p:grpSpPr>
-            <p:pic>
-              <p:nvPicPr>
-                <p:cNvPr id="346" name="pasted-image.pdf" descr="pasted-image.pdf"/>
-                <p:cNvPicPr>
-                  <a:picLocks noChangeAspect="1"/>
-                </p:cNvPicPr>
-                <p:nvPr/>
-              </p:nvPicPr>
-              <p:blipFill>
-                <a:blip r:embed="rId3">
-                  <a:extLst>
-                    <a:ext uri="{BEBA8EAE-BF5A-486C-A8C5-ECC9F3942E4B}">
-                      <a14:imgProps xmlns:a14="http://schemas.microsoft.com/office/drawing/2010/main">
-                        <a14:imgLayer r:embed="rId4">
-                          <a14:imgEffect>
-                            <a14:colorTemperature colorTemp="5093"/>
-                          </a14:imgEffect>
-                        </a14:imgLayer>
-                      </a14:imgProps>
-                    </a:ext>
-                  </a:extLst>
-                </a:blip>
-                <a:stretch>
-                  <a:fillRect/>
-                </a:stretch>
-              </p:blipFill>
-              <p:spPr>
-                <a:xfrm>
-                  <a:off x="6726657" y="4236330"/>
-                  <a:ext cx="534515" cy="549875"/>
-                </a:xfrm>
-                <a:prstGeom prst="rect">
-                  <a:avLst/>
-                </a:prstGeom>
-                <a:ln w="12700" cap="flat">
-                  <a:noFill/>
-                  <a:miter lim="400000"/>
-                </a:ln>
-                <a:effectLst>
-                  <a:outerShdw blurRad="25400" dist="25400" dir="2700000" algn="tl" rotWithShape="0">
-                    <a:prstClr val="black">
-                      <a:alpha val="40000"/>
-                    </a:prstClr>
-                  </a:outerShdw>
-                </a:effectLst>
-              </p:spPr>
-            </p:pic>
-            <p:pic>
-              <p:nvPicPr>
-                <p:cNvPr id="347" name="pasted-image.pdf" descr="pasted-image.pdf"/>
-                <p:cNvPicPr>
-                  <a:picLocks noChangeAspect="1"/>
-                </p:cNvPicPr>
-                <p:nvPr/>
-              </p:nvPicPr>
-              <p:blipFill>
-                <a:blip r:embed="rId3">
-                  <a:extLst>
-                    <a:ext uri="{BEBA8EAE-BF5A-486C-A8C5-ECC9F3942E4B}">
-                      <a14:imgProps xmlns:a14="http://schemas.microsoft.com/office/drawing/2010/main">
-                        <a14:imgLayer r:embed="rId4">
-                          <a14:imgEffect>
-                            <a14:colorTemperature colorTemp="5093"/>
-                          </a14:imgEffect>
-                        </a14:imgLayer>
-                      </a14:imgProps>
-                    </a:ext>
-                  </a:extLst>
-                </a:blip>
-                <a:stretch>
-                  <a:fillRect/>
-                </a:stretch>
-              </p:blipFill>
-              <p:spPr>
-                <a:xfrm>
-                  <a:off x="6666612" y="4312530"/>
-                  <a:ext cx="534515" cy="549875"/>
-                </a:xfrm>
-                <a:prstGeom prst="rect">
-                  <a:avLst/>
-                </a:prstGeom>
-                <a:ln w="12700" cap="flat">
-                  <a:noFill/>
-                  <a:miter lim="400000"/>
-                </a:ln>
-                <a:effectLst>
-                  <a:outerShdw blurRad="25400" dist="25400" dir="2700000" algn="tl" rotWithShape="0">
-                    <a:prstClr val="black">
-                      <a:alpha val="40000"/>
-                    </a:prstClr>
-                  </a:outerShdw>
-                </a:effectLst>
-              </p:spPr>
-            </p:pic>
-            <p:pic>
-              <p:nvPicPr>
-                <p:cNvPr id="348" name="pasted-image.pdf" descr="pasted-image.pdf"/>
-                <p:cNvPicPr>
-                  <a:picLocks noChangeAspect="1"/>
-                </p:cNvPicPr>
-                <p:nvPr/>
-              </p:nvPicPr>
-              <p:blipFill>
-                <a:blip r:embed="rId3">
-                  <a:extLst>
-                    <a:ext uri="{BEBA8EAE-BF5A-486C-A8C5-ECC9F3942E4B}">
-                      <a14:imgProps xmlns:a14="http://schemas.microsoft.com/office/drawing/2010/main">
-                        <a14:imgLayer r:embed="rId4">
-                          <a14:imgEffect>
-                            <a14:colorTemperature colorTemp="5093"/>
-                          </a14:imgEffect>
-                        </a14:imgLayer>
-                      </a14:imgProps>
-                    </a:ext>
-                  </a:extLst>
-                </a:blip>
-                <a:stretch>
-                  <a:fillRect/>
-                </a:stretch>
-              </p:blipFill>
-              <p:spPr>
-                <a:xfrm>
-                  <a:off x="6587851" y="4392855"/>
-                  <a:ext cx="534515" cy="549875"/>
-                </a:xfrm>
-                <a:prstGeom prst="rect">
-                  <a:avLst/>
-                </a:prstGeom>
-                <a:ln w="12700" cap="flat">
-                  <a:noFill/>
-                  <a:miter lim="400000"/>
-                </a:ln>
-                <a:effectLst>
-                  <a:outerShdw blurRad="25400" dist="25400" dir="2700000" algn="tl" rotWithShape="0">
-                    <a:prstClr val="black">
-                      <a:alpha val="40000"/>
-                    </a:prstClr>
-                  </a:outerShdw>
-                </a:effectLst>
-              </p:spPr>
-            </p:pic>
-            <p:sp>
-              <p:nvSpPr>
-                <p:cNvPr id="362" name="Hexagon 1037"/>
-                <p:cNvSpPr/>
-                <p:nvPr/>
-              </p:nvSpPr>
-              <p:spPr>
-                <a:xfrm rot="5400000">
-                  <a:off x="6704130" y="4540500"/>
-                  <a:ext cx="303491" cy="275941"/>
-                </a:xfrm>
-                <a:custGeom>
-                  <a:avLst/>
-                  <a:gdLst>
-                    <a:gd name="connsiteX0" fmla="*/ 0 w 1364847"/>
-                    <a:gd name="connsiteY0" fmla="*/ 612107 h 1224213"/>
-                    <a:gd name="connsiteX1" fmla="*/ 306053 w 1364847"/>
-                    <a:gd name="connsiteY1" fmla="*/ 0 h 1224213"/>
-                    <a:gd name="connsiteX2" fmla="*/ 1058794 w 1364847"/>
-                    <a:gd name="connsiteY2" fmla="*/ 0 h 1224213"/>
-                    <a:gd name="connsiteX3" fmla="*/ 1364847 w 1364847"/>
-                    <a:gd name="connsiteY3" fmla="*/ 612107 h 1224213"/>
-                    <a:gd name="connsiteX4" fmla="*/ 1058794 w 1364847"/>
-                    <a:gd name="connsiteY4" fmla="*/ 1224213 h 1224213"/>
-                    <a:gd name="connsiteX5" fmla="*/ 306053 w 1364847"/>
-                    <a:gd name="connsiteY5" fmla="*/ 1224213 h 1224213"/>
-                    <a:gd name="connsiteX6" fmla="*/ 0 w 1364847"/>
-                    <a:gd name="connsiteY6" fmla="*/ 612107 h 1224213"/>
-                    <a:gd name="connsiteX0" fmla="*/ 0 w 1364847"/>
-                    <a:gd name="connsiteY0" fmla="*/ 612107 h 1236913"/>
-                    <a:gd name="connsiteX1" fmla="*/ 306053 w 1364847"/>
-                    <a:gd name="connsiteY1" fmla="*/ 0 h 1236913"/>
-                    <a:gd name="connsiteX2" fmla="*/ 1058794 w 1364847"/>
-                    <a:gd name="connsiteY2" fmla="*/ 0 h 1236913"/>
-                    <a:gd name="connsiteX3" fmla="*/ 1364847 w 1364847"/>
-                    <a:gd name="connsiteY3" fmla="*/ 612107 h 1236913"/>
-                    <a:gd name="connsiteX4" fmla="*/ 1058794 w 1364847"/>
-                    <a:gd name="connsiteY4" fmla="*/ 1224213 h 1236913"/>
-                    <a:gd name="connsiteX5" fmla="*/ 356853 w 1364847"/>
-                    <a:gd name="connsiteY5" fmla="*/ 1236913 h 1236913"/>
-                    <a:gd name="connsiteX6" fmla="*/ 0 w 1364847"/>
-                    <a:gd name="connsiteY6" fmla="*/ 612107 h 1236913"/>
-                    <a:gd name="connsiteX0" fmla="*/ 0 w 1364847"/>
-                    <a:gd name="connsiteY0" fmla="*/ 612107 h 1230563"/>
-                    <a:gd name="connsiteX1" fmla="*/ 306053 w 1364847"/>
-                    <a:gd name="connsiteY1" fmla="*/ 0 h 1230563"/>
-                    <a:gd name="connsiteX2" fmla="*/ 1058794 w 1364847"/>
-                    <a:gd name="connsiteY2" fmla="*/ 0 h 1230563"/>
-                    <a:gd name="connsiteX3" fmla="*/ 1364847 w 1364847"/>
-                    <a:gd name="connsiteY3" fmla="*/ 612107 h 1230563"/>
-                    <a:gd name="connsiteX4" fmla="*/ 1058794 w 1364847"/>
-                    <a:gd name="connsiteY4" fmla="*/ 1224213 h 1230563"/>
-                    <a:gd name="connsiteX5" fmla="*/ 331453 w 1364847"/>
-                    <a:gd name="connsiteY5" fmla="*/ 1230563 h 1230563"/>
-                    <a:gd name="connsiteX6" fmla="*/ 0 w 1364847"/>
-                    <a:gd name="connsiteY6" fmla="*/ 612107 h 1230563"/>
-                    <a:gd name="connsiteX0" fmla="*/ 0 w 1364847"/>
-                    <a:gd name="connsiteY0" fmla="*/ 612107 h 1249613"/>
-                    <a:gd name="connsiteX1" fmla="*/ 306053 w 1364847"/>
-                    <a:gd name="connsiteY1" fmla="*/ 0 h 1249613"/>
-                    <a:gd name="connsiteX2" fmla="*/ 1058794 w 1364847"/>
-                    <a:gd name="connsiteY2" fmla="*/ 0 h 1249613"/>
-                    <a:gd name="connsiteX3" fmla="*/ 1364847 w 1364847"/>
-                    <a:gd name="connsiteY3" fmla="*/ 612107 h 1249613"/>
-                    <a:gd name="connsiteX4" fmla="*/ 1014344 w 1364847"/>
-                    <a:gd name="connsiteY4" fmla="*/ 1249613 h 1249613"/>
-                    <a:gd name="connsiteX5" fmla="*/ 331453 w 1364847"/>
-                    <a:gd name="connsiteY5" fmla="*/ 1230563 h 1249613"/>
-                    <a:gd name="connsiteX6" fmla="*/ 0 w 1364847"/>
-                    <a:gd name="connsiteY6" fmla="*/ 612107 h 1249613"/>
-                    <a:gd name="connsiteX0" fmla="*/ 0 w 1364847"/>
-                    <a:gd name="connsiteY0" fmla="*/ 612107 h 1249613"/>
-                    <a:gd name="connsiteX1" fmla="*/ 306053 w 1364847"/>
-                    <a:gd name="connsiteY1" fmla="*/ 0 h 1249613"/>
-                    <a:gd name="connsiteX2" fmla="*/ 1058794 w 1364847"/>
-                    <a:gd name="connsiteY2" fmla="*/ 0 h 1249613"/>
-                    <a:gd name="connsiteX3" fmla="*/ 1364847 w 1364847"/>
-                    <a:gd name="connsiteY3" fmla="*/ 643857 h 1249613"/>
-                    <a:gd name="connsiteX4" fmla="*/ 1014344 w 1364847"/>
-                    <a:gd name="connsiteY4" fmla="*/ 1249613 h 1249613"/>
-                    <a:gd name="connsiteX5" fmla="*/ 331453 w 1364847"/>
-                    <a:gd name="connsiteY5" fmla="*/ 1230563 h 1249613"/>
-                    <a:gd name="connsiteX6" fmla="*/ 0 w 1364847"/>
-                    <a:gd name="connsiteY6" fmla="*/ 612107 h 1249613"/>
-                    <a:gd name="connsiteX0" fmla="*/ 0 w 1364847"/>
-                    <a:gd name="connsiteY0" fmla="*/ 637507 h 1275013"/>
-                    <a:gd name="connsiteX1" fmla="*/ 306053 w 1364847"/>
-                    <a:gd name="connsiteY1" fmla="*/ 25400 h 1275013"/>
-                    <a:gd name="connsiteX2" fmla="*/ 1007994 w 1364847"/>
-                    <a:gd name="connsiteY2" fmla="*/ 0 h 1275013"/>
-                    <a:gd name="connsiteX3" fmla="*/ 1364847 w 1364847"/>
-                    <a:gd name="connsiteY3" fmla="*/ 669257 h 1275013"/>
-                    <a:gd name="connsiteX4" fmla="*/ 1014344 w 1364847"/>
-                    <a:gd name="connsiteY4" fmla="*/ 1275013 h 1275013"/>
-                    <a:gd name="connsiteX5" fmla="*/ 331453 w 1364847"/>
-                    <a:gd name="connsiteY5" fmla="*/ 1255963 h 1275013"/>
-                    <a:gd name="connsiteX6" fmla="*/ 0 w 1364847"/>
-                    <a:gd name="connsiteY6" fmla="*/ 637507 h 1275013"/>
-                    <a:gd name="connsiteX0" fmla="*/ 0 w 1364847"/>
-                    <a:gd name="connsiteY0" fmla="*/ 643857 h 1281363"/>
-                    <a:gd name="connsiteX1" fmla="*/ 344153 w 1364847"/>
-                    <a:gd name="connsiteY1" fmla="*/ 0 h 1281363"/>
-                    <a:gd name="connsiteX2" fmla="*/ 1007994 w 1364847"/>
-                    <a:gd name="connsiteY2" fmla="*/ 6350 h 1281363"/>
-                    <a:gd name="connsiteX3" fmla="*/ 1364847 w 1364847"/>
-                    <a:gd name="connsiteY3" fmla="*/ 675607 h 1281363"/>
-                    <a:gd name="connsiteX4" fmla="*/ 1014344 w 1364847"/>
-                    <a:gd name="connsiteY4" fmla="*/ 1281363 h 1281363"/>
-                    <a:gd name="connsiteX5" fmla="*/ 331453 w 1364847"/>
-                    <a:gd name="connsiteY5" fmla="*/ 1262313 h 1281363"/>
-                    <a:gd name="connsiteX6" fmla="*/ 0 w 1364847"/>
-                    <a:gd name="connsiteY6" fmla="*/ 643857 h 1281363"/>
-                    <a:gd name="connsiteX0" fmla="*/ 0 w 1364847"/>
-                    <a:gd name="connsiteY0" fmla="*/ 643857 h 1281363"/>
-                    <a:gd name="connsiteX1" fmla="*/ 344153 w 1364847"/>
-                    <a:gd name="connsiteY1" fmla="*/ 0 h 1281363"/>
-                    <a:gd name="connsiteX2" fmla="*/ 1007994 w 1364847"/>
-                    <a:gd name="connsiteY2" fmla="*/ 6350 h 1281363"/>
-                    <a:gd name="connsiteX3" fmla="*/ 1364847 w 1364847"/>
-                    <a:gd name="connsiteY3" fmla="*/ 675607 h 1281363"/>
-                    <a:gd name="connsiteX4" fmla="*/ 1014344 w 1364847"/>
-                    <a:gd name="connsiteY4" fmla="*/ 1281363 h 1281363"/>
-                    <a:gd name="connsiteX5" fmla="*/ 369553 w 1364847"/>
-                    <a:gd name="connsiteY5" fmla="*/ 1275013 h 1281363"/>
-                    <a:gd name="connsiteX6" fmla="*/ 0 w 1364847"/>
-                    <a:gd name="connsiteY6" fmla="*/ 643857 h 1281363"/>
-                    <a:gd name="connsiteX0" fmla="*/ 0 w 1390247"/>
-                    <a:gd name="connsiteY0" fmla="*/ 643857 h 1281363"/>
-                    <a:gd name="connsiteX1" fmla="*/ 344153 w 1390247"/>
-                    <a:gd name="connsiteY1" fmla="*/ 0 h 1281363"/>
-                    <a:gd name="connsiteX2" fmla="*/ 1007994 w 1390247"/>
-                    <a:gd name="connsiteY2" fmla="*/ 6350 h 1281363"/>
-                    <a:gd name="connsiteX3" fmla="*/ 1390247 w 1390247"/>
-                    <a:gd name="connsiteY3" fmla="*/ 656557 h 1281363"/>
-                    <a:gd name="connsiteX4" fmla="*/ 1014344 w 1390247"/>
-                    <a:gd name="connsiteY4" fmla="*/ 1281363 h 1281363"/>
-                    <a:gd name="connsiteX5" fmla="*/ 369553 w 1390247"/>
-                    <a:gd name="connsiteY5" fmla="*/ 1275013 h 1281363"/>
-                    <a:gd name="connsiteX6" fmla="*/ 0 w 1390247"/>
-                    <a:gd name="connsiteY6" fmla="*/ 643857 h 1281363"/>
-                    <a:gd name="connsiteX0" fmla="*/ 0 w 1390247"/>
-                    <a:gd name="connsiteY0" fmla="*/ 643857 h 1281363"/>
-                    <a:gd name="connsiteX1" fmla="*/ 344153 w 1390247"/>
-                    <a:gd name="connsiteY1" fmla="*/ 0 h 1281363"/>
-                    <a:gd name="connsiteX2" fmla="*/ 1007994 w 1390247"/>
-                    <a:gd name="connsiteY2" fmla="*/ 6350 h 1281363"/>
-                    <a:gd name="connsiteX3" fmla="*/ 1390247 w 1390247"/>
-                    <a:gd name="connsiteY3" fmla="*/ 656557 h 1281363"/>
-                    <a:gd name="connsiteX4" fmla="*/ 1014344 w 1390247"/>
-                    <a:gd name="connsiteY4" fmla="*/ 1281363 h 1281363"/>
-                    <a:gd name="connsiteX5" fmla="*/ 331453 w 1390247"/>
-                    <a:gd name="connsiteY5" fmla="*/ 1275013 h 1281363"/>
-                    <a:gd name="connsiteX6" fmla="*/ 0 w 1390247"/>
-                    <a:gd name="connsiteY6" fmla="*/ 643857 h 1281363"/>
-                    <a:gd name="connsiteX0" fmla="*/ 0 w 1409297"/>
-                    <a:gd name="connsiteY0" fmla="*/ 656557 h 1281363"/>
-                    <a:gd name="connsiteX1" fmla="*/ 363203 w 1409297"/>
-                    <a:gd name="connsiteY1" fmla="*/ 0 h 1281363"/>
-                    <a:gd name="connsiteX2" fmla="*/ 1027044 w 1409297"/>
-                    <a:gd name="connsiteY2" fmla="*/ 6350 h 1281363"/>
-                    <a:gd name="connsiteX3" fmla="*/ 1409297 w 1409297"/>
-                    <a:gd name="connsiteY3" fmla="*/ 656557 h 1281363"/>
-                    <a:gd name="connsiteX4" fmla="*/ 1033394 w 1409297"/>
-                    <a:gd name="connsiteY4" fmla="*/ 1281363 h 1281363"/>
-                    <a:gd name="connsiteX5" fmla="*/ 350503 w 1409297"/>
-                    <a:gd name="connsiteY5" fmla="*/ 1275013 h 1281363"/>
-                    <a:gd name="connsiteX6" fmla="*/ 0 w 1409297"/>
-                    <a:gd name="connsiteY6" fmla="*/ 656557 h 1281363"/>
-                    <a:gd name="connsiteX0" fmla="*/ 0 w 1409297"/>
-                    <a:gd name="connsiteY0" fmla="*/ 656557 h 1281363"/>
-                    <a:gd name="connsiteX1" fmla="*/ 363203 w 1409297"/>
-                    <a:gd name="connsiteY1" fmla="*/ 0 h 1281363"/>
-                    <a:gd name="connsiteX2" fmla="*/ 1046094 w 1409297"/>
-                    <a:gd name="connsiteY2" fmla="*/ 19050 h 1281363"/>
-                    <a:gd name="connsiteX3" fmla="*/ 1409297 w 1409297"/>
-                    <a:gd name="connsiteY3" fmla="*/ 656557 h 1281363"/>
-                    <a:gd name="connsiteX4" fmla="*/ 1033394 w 1409297"/>
-                    <a:gd name="connsiteY4" fmla="*/ 1281363 h 1281363"/>
-                    <a:gd name="connsiteX5" fmla="*/ 350503 w 1409297"/>
-                    <a:gd name="connsiteY5" fmla="*/ 1275013 h 1281363"/>
-                    <a:gd name="connsiteX6" fmla="*/ 0 w 1409297"/>
-                    <a:gd name="connsiteY6" fmla="*/ 656557 h 1281363"/>
-                    <a:gd name="connsiteX0" fmla="*/ 0 w 1409297"/>
-                    <a:gd name="connsiteY0" fmla="*/ 656557 h 1281363"/>
-                    <a:gd name="connsiteX1" fmla="*/ 363203 w 1409297"/>
-                    <a:gd name="connsiteY1" fmla="*/ 0 h 1281363"/>
-                    <a:gd name="connsiteX2" fmla="*/ 1052444 w 1409297"/>
-                    <a:gd name="connsiteY2" fmla="*/ 6350 h 1281363"/>
-                    <a:gd name="connsiteX3" fmla="*/ 1409297 w 1409297"/>
-                    <a:gd name="connsiteY3" fmla="*/ 656557 h 1281363"/>
-                    <a:gd name="connsiteX4" fmla="*/ 1033394 w 1409297"/>
-                    <a:gd name="connsiteY4" fmla="*/ 1281363 h 1281363"/>
-                    <a:gd name="connsiteX5" fmla="*/ 350503 w 1409297"/>
-                    <a:gd name="connsiteY5" fmla="*/ 1275013 h 1281363"/>
-                    <a:gd name="connsiteX6" fmla="*/ 0 w 1409297"/>
-                    <a:gd name="connsiteY6" fmla="*/ 656557 h 1281363"/>
-                  </a:gdLst>
-                  <a:ahLst/>
-                  <a:cxnLst>
-                    <a:cxn ang="0">
-                      <a:pos x="connsiteX0" y="connsiteY0"/>
-                    </a:cxn>
-                    <a:cxn ang="0">
-                      <a:pos x="connsiteX1" y="connsiteY1"/>
-                    </a:cxn>
-                    <a:cxn ang="0">
-                      <a:pos x="connsiteX2" y="connsiteY2"/>
-                    </a:cxn>
-                    <a:cxn ang="0">
-                      <a:pos x="connsiteX3" y="connsiteY3"/>
-                    </a:cxn>
-                    <a:cxn ang="0">
-                      <a:pos x="connsiteX4" y="connsiteY4"/>
-                    </a:cxn>
-                    <a:cxn ang="0">
-                      <a:pos x="connsiteX5" y="connsiteY5"/>
-                    </a:cxn>
-                    <a:cxn ang="0">
-                      <a:pos x="connsiteX6" y="connsiteY6"/>
-                    </a:cxn>
-                  </a:cxnLst>
-                  <a:rect l="l" t="t" r="r" b="b"/>
-                  <a:pathLst>
-                    <a:path w="1409297" h="1281363">
-                      <a:moveTo>
-                        <a:pt x="0" y="656557"/>
-                      </a:moveTo>
-                      <a:lnTo>
-                        <a:pt x="363203" y="0"/>
-                      </a:lnTo>
-                      <a:lnTo>
-                        <a:pt x="1052444" y="6350"/>
-                      </a:lnTo>
-                      <a:lnTo>
-                        <a:pt x="1409297" y="656557"/>
-                      </a:lnTo>
-                      <a:lnTo>
-                        <a:pt x="1033394" y="1281363"/>
-                      </a:lnTo>
-                      <a:lnTo>
-                        <a:pt x="350503" y="1275013"/>
-                      </a:lnTo>
-                      <a:lnTo>
-                        <a:pt x="0" y="656557"/>
-                      </a:lnTo>
-                      <a:close/>
-                    </a:path>
-                  </a:pathLst>
-                </a:custGeom>
-                <a:solidFill>
-                  <a:schemeClr val="bg1"/>
-                </a:solidFill>
-                <a:ln>
-                  <a:noFill/>
-                </a:ln>
-              </p:spPr>
-              <p:style>
-                <a:lnRef idx="2">
-                  <a:schemeClr val="accent1">
-                    <a:shade val="50000"/>
-                  </a:schemeClr>
-                </a:lnRef>
-                <a:fillRef idx="1">
-                  <a:schemeClr val="accent1"/>
-                </a:fillRef>
-                <a:effectRef idx="0">
-                  <a:schemeClr val="accent1"/>
-                </a:effectRef>
-                <a:fontRef idx="minor">
-                  <a:schemeClr val="lt1"/>
-                </a:fontRef>
-              </p:style>
-              <p:txBody>
-                <a:bodyPr wrap="none" rtlCol="0" anchor="ctr"/>
-                <a:lstStyle/>
-                <a:p>
-                  <a:pPr algn="ctr"/>
-                  <a:endParaRPr lang="en-US" sz="1400" smtClean="0">
-                    <a:solidFill>
-                      <a:schemeClr val="tx1">
-                        <a:lumMod val="85000"/>
-                        <a:lumOff val="15000"/>
-                      </a:schemeClr>
-                    </a:solidFill>
-                  </a:endParaRPr>
-                </a:p>
-              </p:txBody>
-            </p:sp>
-            <p:pic>
-              <p:nvPicPr>
-                <p:cNvPr id="363" name="Picture 362"/>
-                <p:cNvPicPr>
-                  <a:picLocks noChangeAspect="1"/>
-                </p:cNvPicPr>
-                <p:nvPr/>
-              </p:nvPicPr>
-              <p:blipFill>
-                <a:blip r:embed="rId6">
-                  <a:extLst>
-                    <a:ext uri="{28A0092B-C50C-407E-A947-70E740481C1C}">
-                      <a14:useLocalDpi xmlns:a14="http://schemas.microsoft.com/office/drawing/2010/main" val="0"/>
-                    </a:ext>
-                  </a:extLst>
-                </a:blip>
-                <a:stretch>
-                  <a:fillRect/>
-                </a:stretch>
-              </p:blipFill>
-              <p:spPr>
-                <a:xfrm>
-                  <a:off x="6702294" y="4507799"/>
-                  <a:ext cx="305629" cy="319987"/>
-                </a:xfrm>
-                <a:prstGeom prst="rect">
-                  <a:avLst/>
-                </a:prstGeom>
-                <a:ln>
-                  <a:noFill/>
-                </a:ln>
-              </p:spPr>
-            </p:pic>
-          </p:grpSp>
-        </p:grpSp>
-        <p:sp>
-          <p:nvSpPr>
-            <p:cNvPr id="461" name="Hexagon 460"/>
-            <p:cNvSpPr/>
-            <p:nvPr/>
-          </p:nvSpPr>
-          <p:spPr>
-            <a:xfrm>
-              <a:off x="7008984" y="2715905"/>
-              <a:ext cx="962406" cy="824502"/>
-            </a:xfrm>
-            <a:prstGeom prst="hexagon">
-              <a:avLst/>
-            </a:prstGeom>
-            <a:solidFill>
-              <a:schemeClr val="accent6">
-                <a:lumMod val="40000"/>
-                <a:lumOff val="60000"/>
-              </a:schemeClr>
-            </a:solidFill>
-            <a:ln>
-              <a:noFill/>
-            </a:ln>
-          </p:spPr>
-          <p:style>
-            <a:lnRef idx="2">
-              <a:schemeClr val="accent1">
-                <a:shade val="50000"/>
-              </a:schemeClr>
-            </a:lnRef>
-            <a:fillRef idx="1">
-              <a:schemeClr val="accent1"/>
-            </a:fillRef>
-            <a:effectRef idx="0">
-              <a:schemeClr val="accent1"/>
-            </a:effectRef>
-            <a:fontRef idx="minor">
-              <a:schemeClr val="lt1"/>
-            </a:fontRef>
-          </p:style>
-          <p:txBody>
-            <a:bodyPr wrap="none" rtlCol="0" anchor="ctr"/>
-            <a:lstStyle/>
-            <a:p>
-              <a:pPr algn="ctr"/>
-              <a:endParaRPr lang="en-US" sz="1400" smtClean="0">
-                <a:solidFill>
-                  <a:schemeClr val="tx1">
-                    <a:lumMod val="85000"/>
-                    <a:lumOff val="15000"/>
-                  </a:schemeClr>
-                </a:solidFill>
-              </a:endParaRPr>
-            </a:p>
-          </p:txBody>
-        </p:sp>
-        <p:grpSp>
-          <p:nvGrpSpPr>
-            <p:cNvPr id="484" name="Group 483"/>
-            <p:cNvGrpSpPr/>
-            <p:nvPr/>
-          </p:nvGrpSpPr>
-          <p:grpSpPr>
-            <a:xfrm>
-              <a:off x="7153527" y="2774956"/>
-              <a:ext cx="673321" cy="706400"/>
-              <a:chOff x="7842152" y="3407874"/>
-              <a:chExt cx="673321" cy="706400"/>
-            </a:xfrm>
-          </p:grpSpPr>
-          <p:pic>
-            <p:nvPicPr>
-              <p:cNvPr id="463" name="pasted-image.pdf" descr="pasted-image.pdf"/>
-              <p:cNvPicPr>
-                <a:picLocks noChangeAspect="1"/>
-              </p:cNvPicPr>
-              <p:nvPr/>
-            </p:nvPicPr>
-            <p:blipFill>
-              <a:blip r:embed="rId3">
-                <a:extLst>
-                  <a:ext uri="{BEBA8EAE-BF5A-486C-A8C5-ECC9F3942E4B}">
-                    <a14:imgProps xmlns:a14="http://schemas.microsoft.com/office/drawing/2010/main">
-                      <a14:imgLayer r:embed="rId4">
-                        <a14:imgEffect>
-                          <a14:colorTemperature colorTemp="5093"/>
-                        </a14:imgEffect>
-                      </a14:imgLayer>
-                    </a14:imgProps>
-                  </a:ext>
-                </a:extLst>
-              </a:blip>
-              <a:stretch>
-                <a:fillRect/>
-              </a:stretch>
-            </p:blipFill>
-            <p:spPr>
-              <a:xfrm>
-                <a:off x="7980958" y="3407874"/>
-                <a:ext cx="534515" cy="549875"/>
-              </a:xfrm>
-              <a:prstGeom prst="rect">
-                <a:avLst/>
-              </a:prstGeom>
-              <a:ln w="12700" cap="flat">
-                <a:noFill/>
-                <a:miter lim="400000"/>
-              </a:ln>
-              <a:effectLst>
-                <a:outerShdw blurRad="25400" dist="25400" dir="2700000" algn="tl" rotWithShape="0">
-                  <a:prstClr val="black">
-                    <a:alpha val="40000"/>
-                  </a:prstClr>
-                </a:outerShdw>
-              </a:effectLst>
-            </p:spPr>
-          </p:pic>
-          <p:pic>
-            <p:nvPicPr>
-              <p:cNvPr id="464" name="pasted-image.pdf" descr="pasted-image.pdf"/>
-              <p:cNvPicPr>
-                <a:picLocks noChangeAspect="1"/>
-              </p:cNvPicPr>
-              <p:nvPr/>
-            </p:nvPicPr>
-            <p:blipFill>
-              <a:blip r:embed="rId3">
-                <a:extLst>
-                  <a:ext uri="{BEBA8EAE-BF5A-486C-A8C5-ECC9F3942E4B}">
-                    <a14:imgProps xmlns:a14="http://schemas.microsoft.com/office/drawing/2010/main">
-                      <a14:imgLayer r:embed="rId4">
-                        <a14:imgEffect>
-                          <a14:colorTemperature colorTemp="5093"/>
-                        </a14:imgEffect>
-                      </a14:imgLayer>
-                    </a14:imgProps>
-                  </a:ext>
-                </a:extLst>
-              </a:blip>
-              <a:stretch>
-                <a:fillRect/>
-              </a:stretch>
-            </p:blipFill>
-            <p:spPr>
-              <a:xfrm>
-                <a:off x="7920913" y="3484074"/>
-                <a:ext cx="534515" cy="549875"/>
-              </a:xfrm>
-              <a:prstGeom prst="rect">
-                <a:avLst/>
-              </a:prstGeom>
-              <a:ln w="12700" cap="flat">
-                <a:noFill/>
-                <a:miter lim="400000"/>
-              </a:ln>
-              <a:effectLst>
-                <a:outerShdw blurRad="25400" dist="25400" dir="2700000" algn="tl" rotWithShape="0">
-                  <a:prstClr val="black">
-                    <a:alpha val="40000"/>
-                  </a:prstClr>
-                </a:outerShdw>
-              </a:effectLst>
-            </p:spPr>
-          </p:pic>
-          <p:pic>
-            <p:nvPicPr>
-              <p:cNvPr id="465" name="pasted-image.pdf" descr="pasted-image.pdf"/>
-              <p:cNvPicPr>
-                <a:picLocks noChangeAspect="1"/>
-              </p:cNvPicPr>
-              <p:nvPr/>
-            </p:nvPicPr>
-            <p:blipFill>
-              <a:blip r:embed="rId3">
-                <a:extLst>
-                  <a:ext uri="{BEBA8EAE-BF5A-486C-A8C5-ECC9F3942E4B}">
-                    <a14:imgProps xmlns:a14="http://schemas.microsoft.com/office/drawing/2010/main">
-                      <a14:imgLayer r:embed="rId4">
-                        <a14:imgEffect>
-                          <a14:colorTemperature colorTemp="5093"/>
-                        </a14:imgEffect>
-                      </a14:imgLayer>
-                    </a14:imgProps>
-                  </a:ext>
-                </a:extLst>
-              </a:blip>
-              <a:stretch>
-                <a:fillRect/>
-              </a:stretch>
-            </p:blipFill>
-            <p:spPr>
-              <a:xfrm>
-                <a:off x="7842152" y="3564399"/>
-                <a:ext cx="534515" cy="549875"/>
-              </a:xfrm>
-              <a:prstGeom prst="rect">
-                <a:avLst/>
-              </a:prstGeom>
-              <a:ln w="12700" cap="flat">
-                <a:noFill/>
-                <a:miter lim="400000"/>
-              </a:ln>
-              <a:effectLst>
-                <a:outerShdw blurRad="25400" dist="25400" dir="2700000" algn="tl" rotWithShape="0">
-                  <a:prstClr val="black">
-                    <a:alpha val="40000"/>
-                  </a:prstClr>
-                </a:outerShdw>
-              </a:effectLst>
             </p:spPr>
           </p:pic>
         </p:grpSp>
@@ -5084,10 +5078,10 @@
         </p:nvGrpSpPr>
         <p:grpSpPr>
           <a:xfrm>
-            <a:off x="6975298" y="2907473"/>
-            <a:ext cx="1947672" cy="1880187"/>
-            <a:chOff x="7007735" y="2904360"/>
-            <a:chExt cx="1947672" cy="1880187"/>
+            <a:off x="6975298" y="2890469"/>
+            <a:ext cx="1989192" cy="1880187"/>
+            <a:chOff x="6975298" y="2890469"/>
+            <a:chExt cx="1989192" cy="1880187"/>
           </a:xfrm>
         </p:grpSpPr>
         <p:grpSp>
@@ -5098,10 +5092,10 @@
           </p:nvGrpSpPr>
           <p:grpSpPr>
             <a:xfrm>
-              <a:off x="7007735" y="2904360"/>
-              <a:ext cx="1947672" cy="1880187"/>
-              <a:chOff x="7077313" y="4216331"/>
-              <a:chExt cx="1947672" cy="1880187"/>
+              <a:off x="6975298" y="2890469"/>
+              <a:ext cx="1989192" cy="1880187"/>
+              <a:chOff x="7044876" y="4202440"/>
+              <a:chExt cx="1989192" cy="1880187"/>
             </a:xfrm>
           </p:grpSpPr>
           <p:sp>
@@ -5112,8 +5106,8 @@
             </p:nvSpPr>
             <p:spPr>
               <a:xfrm>
-                <a:off x="7077313" y="4216331"/>
-                <a:ext cx="1947672" cy="1880187"/>
+                <a:off x="7044876" y="4202440"/>
+                <a:ext cx="1989192" cy="1880187"/>
               </a:xfrm>
               <a:prstGeom prst="rect">
                 <a:avLst/>
@@ -5265,11 +5259,11 @@
                   <p:nvPr/>
                 </p:nvPicPr>
                 <p:blipFill>
-                  <a:blip r:embed="rId3">
+                  <a:blip r:embed="rId12">
                     <a:extLst>
                       <a:ext uri="{BEBA8EAE-BF5A-486C-A8C5-ECC9F3942E4B}">
                         <a14:imgProps xmlns:a14="http://schemas.microsoft.com/office/drawing/2010/main">
-                          <a14:imgLayer r:embed="rId4">
+                          <a14:imgLayer r:embed="rId13">
                             <a14:imgEffect>
                               <a14:colorTemperature colorTemp="5093"/>
                             </a14:imgEffect>
@@ -5312,11 +5306,11 @@
                   <p:nvPr/>
                 </p:nvPicPr>
                 <p:blipFill>
-                  <a:blip r:embed="rId3">
+                  <a:blip r:embed="rId12">
                     <a:extLst>
                       <a:ext uri="{BEBA8EAE-BF5A-486C-A8C5-ECC9F3942E4B}">
                         <a14:imgProps xmlns:a14="http://schemas.microsoft.com/office/drawing/2010/main">
-                          <a14:imgLayer r:embed="rId4">
+                          <a14:imgLayer r:embed="rId13">
                             <a14:imgEffect>
                               <a14:colorTemperature colorTemp="5093"/>
                             </a14:imgEffect>
@@ -5359,11 +5353,11 @@
                   <p:nvPr/>
                 </p:nvPicPr>
                 <p:blipFill>
-                  <a:blip r:embed="rId3">
+                  <a:blip r:embed="rId12">
                     <a:extLst>
                       <a:ext uri="{BEBA8EAE-BF5A-486C-A8C5-ECC9F3942E4B}">
                         <a14:imgProps xmlns:a14="http://schemas.microsoft.com/office/drawing/2010/main">
-                          <a14:imgLayer r:embed="rId4">
+                          <a14:imgLayer r:embed="rId13">
                             <a14:imgEffect>
                               <a14:colorTemperature colorTemp="5093"/>
                             </a14:imgEffect>
@@ -5543,11 +5537,11 @@
                     <p:nvPr/>
                   </p:nvPicPr>
                   <p:blipFill>
-                    <a:blip r:embed="rId3">
+                    <a:blip r:embed="rId12">
                       <a:extLst>
                         <a:ext uri="{BEBA8EAE-BF5A-486C-A8C5-ECC9F3942E4B}">
                           <a14:imgProps xmlns:a14="http://schemas.microsoft.com/office/drawing/2010/main">
-                            <a14:imgLayer r:embed="rId4">
+                            <a14:imgLayer r:embed="rId13">
                               <a14:imgEffect>
                                 <a14:colorTemperature colorTemp="5093"/>
                               </a14:imgEffect>
@@ -5590,11 +5584,11 @@
                     <p:nvPr/>
                   </p:nvPicPr>
                   <p:blipFill>
-                    <a:blip r:embed="rId3">
+                    <a:blip r:embed="rId12">
                       <a:extLst>
                         <a:ext uri="{BEBA8EAE-BF5A-486C-A8C5-ECC9F3942E4B}">
                           <a14:imgProps xmlns:a14="http://schemas.microsoft.com/office/drawing/2010/main">
-                            <a14:imgLayer r:embed="rId4">
+                            <a14:imgLayer r:embed="rId13">
                               <a14:imgEffect>
                                 <a14:colorTemperature colorTemp="5093"/>
                               </a14:imgEffect>
@@ -5637,11 +5631,11 @@
                     <p:nvPr/>
                   </p:nvPicPr>
                   <p:blipFill>
-                    <a:blip r:embed="rId3">
+                    <a:blip r:embed="rId12">
                       <a:extLst>
                         <a:ext uri="{BEBA8EAE-BF5A-486C-A8C5-ECC9F3942E4B}">
                           <a14:imgProps xmlns:a14="http://schemas.microsoft.com/office/drawing/2010/main">
-                            <a14:imgLayer r:embed="rId4">
+                            <a14:imgLayer r:embed="rId13">
                               <a14:imgEffect>
                                 <a14:colorTemperature colorTemp="5093"/>
                               </a14:imgEffect>
@@ -5830,11 +5824,11 @@
                   <p:nvPr/>
                 </p:nvPicPr>
                 <p:blipFill>
-                  <a:blip r:embed="rId3">
+                  <a:blip r:embed="rId12">
                     <a:extLst>
                       <a:ext uri="{BEBA8EAE-BF5A-486C-A8C5-ECC9F3942E4B}">
                         <a14:imgProps xmlns:a14="http://schemas.microsoft.com/office/drawing/2010/main">
-                          <a14:imgLayer r:embed="rId4">
+                          <a14:imgLayer r:embed="rId13">
                             <a14:imgEffect>
                               <a14:colorTemperature colorTemp="5093"/>
                             </a14:imgEffect>
@@ -5877,11 +5871,11 @@
                   <p:nvPr/>
                 </p:nvPicPr>
                 <p:blipFill>
-                  <a:blip r:embed="rId3">
+                  <a:blip r:embed="rId12">
                     <a:extLst>
                       <a:ext uri="{BEBA8EAE-BF5A-486C-A8C5-ECC9F3942E4B}">
                         <a14:imgProps xmlns:a14="http://schemas.microsoft.com/office/drawing/2010/main">
-                          <a14:imgLayer r:embed="rId4">
+                          <a14:imgLayer r:embed="rId13">
                             <a14:imgEffect>
                               <a14:colorTemperature colorTemp="5093"/>
                             </a14:imgEffect>
@@ -5924,11 +5918,11 @@
                   <p:nvPr/>
                 </p:nvPicPr>
                 <p:blipFill>
-                  <a:blip r:embed="rId3">
+                  <a:blip r:embed="rId12">
                     <a:extLst>
                       <a:ext uri="{BEBA8EAE-BF5A-486C-A8C5-ECC9F3942E4B}">
                         <a14:imgProps xmlns:a14="http://schemas.microsoft.com/office/drawing/2010/main">
-                          <a14:imgLayer r:embed="rId4">
+                          <a14:imgLayer r:embed="rId13">
                             <a14:imgEffect>
                               <a14:colorTemperature colorTemp="5093"/>
                             </a14:imgEffect>

</xml_diff>